<commit_message>
rcl logging images update.
Signed-off-by: Tomoya.Fujita <Tomoya.Fujita@sony.com>
</commit_message>
<xml_diff>
--- a/source/images.pptx
+++ b/source/images.pptx
@@ -5,10 +5,10 @@
     <p:sldMasterId id="2147483688" r:id="rId1"/>
   </p:sldMasterIdLst>
   <p:notesMasterIdLst>
-    <p:notesMasterId r:id="rId16"/>
+    <p:notesMasterId r:id="rId18"/>
   </p:notesMasterIdLst>
   <p:handoutMasterIdLst>
-    <p:handoutMasterId r:id="rId17"/>
+    <p:handoutMasterId r:id="rId19"/>
   </p:handoutMasterIdLst>
   <p:sldIdLst>
     <p:sldId id="456" r:id="rId2"/>
@@ -25,6 +25,8 @@
     <p:sldId id="469" r:id="rId13"/>
     <p:sldId id="470" r:id="rId14"/>
     <p:sldId id="471" r:id="rId15"/>
+    <p:sldId id="472" r:id="rId16"/>
+    <p:sldId id="473" r:id="rId17"/>
   </p:sldIdLst>
   <p:sldSz cx="12204700" cy="6859588"/>
   <p:notesSz cx="7099300" cy="10234613"/>
@@ -290,7 +292,7 @@
             <a:fld id="{15664389-FDA7-DD41-A374-B1DA747FDC5A}" type="datetimeFigureOut">
               <a:rPr kumimoji="1" lang="ja-JP" altLang="en-US" smtClean="0"/>
               <a:pPr/>
-              <a:t>2025/12/2</a:t>
+              <a:t>2026/1/19</a:t>
             </a:fld>
             <a:endParaRPr kumimoji="1" lang="ja-JP" altLang="en-US"/>
           </a:p>
@@ -458,7 +460,7 @@
             <a:fld id="{742ED1A7-AB37-4B52-BC42-F90D4DEB2F36}" type="datetimeFigureOut">
               <a:rPr kumimoji="1" lang="ja-JP" altLang="en-US" smtClean="0"/>
               <a:pPr/>
-              <a:t>2025/12/2</a:t>
+              <a:t>2026/1/19</a:t>
             </a:fld>
             <a:endParaRPr kumimoji="1" lang="ja-JP" altLang="en-US"/>
           </a:p>
@@ -23028,6 +23030,2611 @@
 </p:sld>
 </file>
 
+<file path=ppt/slides/slide15.xml><?xml version="1.0" encoding="utf-8"?>
+<p:sld xmlns:a="http://schemas.openxmlformats.org/drawingml/2006/main" xmlns:r="http://schemas.openxmlformats.org/officeDocument/2006/relationships" xmlns:p="http://schemas.openxmlformats.org/presentationml/2006/main">
+  <p:cSld>
+    <p:spTree>
+      <p:nvGrpSpPr>
+        <p:cNvPr id="1" name=""/>
+        <p:cNvGrpSpPr/>
+        <p:nvPr/>
+      </p:nvGrpSpPr>
+      <p:grpSpPr>
+        <a:xfrm>
+          <a:off x="0" y="0"/>
+          <a:ext cx="0" cy="0"/>
+          <a:chOff x="0" y="0"/>
+          <a:chExt cx="0" cy="0"/>
+        </a:xfrm>
+      </p:grpSpPr>
+      <p:sp>
+        <p:nvSpPr>
+          <p:cNvPr id="3" name="Rectangle 2">
+            <a:extLst>
+              <a:ext uri="{FF2B5EF4-FFF2-40B4-BE49-F238E27FC236}">
+                <a16:creationId xmlns:a16="http://schemas.microsoft.com/office/drawing/2014/main" id="{9D46059C-5BC8-CE4D-F351-89B5FF7ADA26}"/>
+              </a:ext>
+            </a:extLst>
+          </p:cNvPr>
+          <p:cNvSpPr/>
+          <p:nvPr/>
+        </p:nvSpPr>
+        <p:spPr>
+          <a:xfrm>
+            <a:off x="2141911" y="1197547"/>
+            <a:ext cx="3456384" cy="792088"/>
+          </a:xfrm>
+          <a:prstGeom prst="rect">
+            <a:avLst/>
+          </a:prstGeom>
+          <a:solidFill>
+            <a:srgbClr val="FFFF00">
+              <a:alpha val="20000"/>
+            </a:srgbClr>
+          </a:solidFill>
+          <a:ln>
+            <a:solidFill>
+              <a:schemeClr val="tx1"/>
+            </a:solidFill>
+          </a:ln>
+        </p:spPr>
+        <p:style>
+          <a:lnRef idx="2">
+            <a:schemeClr val="accent1">
+              <a:shade val="50000"/>
+            </a:schemeClr>
+          </a:lnRef>
+          <a:fillRef idx="1">
+            <a:schemeClr val="accent1"/>
+          </a:fillRef>
+          <a:effectRef idx="0">
+            <a:schemeClr val="accent1"/>
+          </a:effectRef>
+          <a:fontRef idx="minor">
+            <a:schemeClr val="lt1"/>
+          </a:fontRef>
+        </p:style>
+        <p:txBody>
+          <a:bodyPr rtlCol="0" anchor="ctr"/>
+          <a:lstStyle/>
+          <a:p>
+            <a:r>
+              <a:rPr lang="en-US" sz="1400" dirty="0">
+                <a:solidFill>
+                  <a:schemeClr val="tx1"/>
+                </a:solidFill>
+              </a:rPr>
+              <a:t>+ End-user logging calls</a:t>
+            </a:r>
+          </a:p>
+          <a:p>
+            <a:r>
+              <a:rPr lang="en-US" sz="1400" dirty="0">
+                <a:solidFill>
+                  <a:schemeClr val="tx1"/>
+                </a:solidFill>
+              </a:rPr>
+              <a:t>   e.g. </a:t>
+            </a:r>
+            <a:r>
+              <a:rPr lang="en-US" sz="1400" dirty="0" err="1">
+                <a:solidFill>
+                  <a:schemeClr val="tx1"/>
+                </a:solidFill>
+              </a:rPr>
+              <a:t>node.get_logger</a:t>
+            </a:r>
+            <a:r>
+              <a:rPr lang="en-US" sz="1400" dirty="0">
+                <a:solidFill>
+                  <a:schemeClr val="tx1"/>
+                </a:solidFill>
+              </a:rPr>
+              <a:t>().info()</a:t>
+            </a:r>
+          </a:p>
+        </p:txBody>
+      </p:sp>
+      <p:sp>
+        <p:nvSpPr>
+          <p:cNvPr id="4" name="Rectangle 3">
+            <a:extLst>
+              <a:ext uri="{FF2B5EF4-FFF2-40B4-BE49-F238E27FC236}">
+                <a16:creationId xmlns:a16="http://schemas.microsoft.com/office/drawing/2014/main" id="{0F1A321C-AA61-18CD-B63A-513C3582F104}"/>
+              </a:ext>
+            </a:extLst>
+          </p:cNvPr>
+          <p:cNvSpPr/>
+          <p:nvPr/>
+        </p:nvSpPr>
+        <p:spPr>
+          <a:xfrm>
+            <a:off x="2141911" y="837506"/>
+            <a:ext cx="3456383" cy="360040"/>
+          </a:xfrm>
+          <a:prstGeom prst="rect">
+            <a:avLst/>
+          </a:prstGeom>
+          <a:solidFill>
+            <a:schemeClr val="accent5">
+              <a:alpha val="20000"/>
+            </a:schemeClr>
+          </a:solidFill>
+          <a:ln>
+            <a:solidFill>
+              <a:schemeClr val="tx1"/>
+            </a:solidFill>
+          </a:ln>
+        </p:spPr>
+        <p:style>
+          <a:lnRef idx="2">
+            <a:schemeClr val="accent1">
+              <a:shade val="50000"/>
+            </a:schemeClr>
+          </a:lnRef>
+          <a:fillRef idx="1">
+            <a:schemeClr val="accent1"/>
+          </a:fillRef>
+          <a:effectRef idx="0">
+            <a:schemeClr val="accent1"/>
+          </a:effectRef>
+          <a:fontRef idx="minor">
+            <a:schemeClr val="lt1"/>
+          </a:fontRef>
+        </p:style>
+        <p:txBody>
+          <a:bodyPr rtlCol="0" anchor="ctr"/>
+          <a:lstStyle/>
+          <a:p>
+            <a:r>
+              <a:rPr lang="en-US" sz="1600" dirty="0" err="1">
+                <a:solidFill>
+                  <a:schemeClr val="tx1"/>
+                </a:solidFill>
+              </a:rPr>
+              <a:t>rclpy</a:t>
+            </a:r>
+            <a:endParaRPr kumimoji="1" lang="en-US" sz="1600" dirty="0">
+              <a:solidFill>
+                <a:schemeClr val="tx1"/>
+              </a:solidFill>
+            </a:endParaRPr>
+          </a:p>
+        </p:txBody>
+      </p:sp>
+      <p:sp>
+        <p:nvSpPr>
+          <p:cNvPr id="5" name="Rectangle 4">
+            <a:extLst>
+              <a:ext uri="{FF2B5EF4-FFF2-40B4-BE49-F238E27FC236}">
+                <a16:creationId xmlns:a16="http://schemas.microsoft.com/office/drawing/2014/main" id="{565C1146-9F23-425F-91FE-B1D10D08DA11}"/>
+              </a:ext>
+            </a:extLst>
+          </p:cNvPr>
+          <p:cNvSpPr/>
+          <p:nvPr/>
+        </p:nvSpPr>
+        <p:spPr>
+          <a:xfrm>
+            <a:off x="5742311" y="1197547"/>
+            <a:ext cx="3456384" cy="792088"/>
+          </a:xfrm>
+          <a:prstGeom prst="rect">
+            <a:avLst/>
+          </a:prstGeom>
+          <a:solidFill>
+            <a:srgbClr val="FFFF00">
+              <a:alpha val="20000"/>
+            </a:srgbClr>
+          </a:solidFill>
+          <a:ln>
+            <a:solidFill>
+              <a:schemeClr val="tx1"/>
+            </a:solidFill>
+          </a:ln>
+        </p:spPr>
+        <p:style>
+          <a:lnRef idx="2">
+            <a:schemeClr val="accent1">
+              <a:shade val="50000"/>
+            </a:schemeClr>
+          </a:lnRef>
+          <a:fillRef idx="1">
+            <a:schemeClr val="accent1"/>
+          </a:fillRef>
+          <a:effectRef idx="0">
+            <a:schemeClr val="accent1"/>
+          </a:effectRef>
+          <a:fontRef idx="minor">
+            <a:schemeClr val="lt1"/>
+          </a:fontRef>
+        </p:style>
+        <p:txBody>
+          <a:bodyPr rtlCol="0" anchor="ctr"/>
+          <a:lstStyle/>
+          <a:p>
+            <a:r>
+              <a:rPr lang="en-US" sz="1400" dirty="0">
+                <a:solidFill>
+                  <a:schemeClr val="tx1"/>
+                </a:solidFill>
+              </a:rPr>
+              <a:t>+ End-user logging calls</a:t>
+            </a:r>
+          </a:p>
+          <a:p>
+            <a:r>
+              <a:rPr lang="en-US" sz="1400" dirty="0">
+                <a:solidFill>
+                  <a:schemeClr val="tx1"/>
+                </a:solidFill>
+              </a:rPr>
+              <a:t>   e.g. RCLCPP_INFO</a:t>
+            </a:r>
+          </a:p>
+        </p:txBody>
+      </p:sp>
+      <p:sp>
+        <p:nvSpPr>
+          <p:cNvPr id="6" name="Rectangle 5">
+            <a:extLst>
+              <a:ext uri="{FF2B5EF4-FFF2-40B4-BE49-F238E27FC236}">
+                <a16:creationId xmlns:a16="http://schemas.microsoft.com/office/drawing/2014/main" id="{4CC71C83-7BB2-41D7-AFE4-13C6554C6BD4}"/>
+              </a:ext>
+            </a:extLst>
+          </p:cNvPr>
+          <p:cNvSpPr/>
+          <p:nvPr/>
+        </p:nvSpPr>
+        <p:spPr>
+          <a:xfrm>
+            <a:off x="5742311" y="837506"/>
+            <a:ext cx="3456383" cy="360040"/>
+          </a:xfrm>
+          <a:prstGeom prst="rect">
+            <a:avLst/>
+          </a:prstGeom>
+          <a:solidFill>
+            <a:schemeClr val="accent5">
+              <a:alpha val="20000"/>
+            </a:schemeClr>
+          </a:solidFill>
+          <a:ln>
+            <a:solidFill>
+              <a:schemeClr val="tx1"/>
+            </a:solidFill>
+          </a:ln>
+        </p:spPr>
+        <p:style>
+          <a:lnRef idx="2">
+            <a:schemeClr val="accent1">
+              <a:shade val="50000"/>
+            </a:schemeClr>
+          </a:lnRef>
+          <a:fillRef idx="1">
+            <a:schemeClr val="accent1"/>
+          </a:fillRef>
+          <a:effectRef idx="0">
+            <a:schemeClr val="accent1"/>
+          </a:effectRef>
+          <a:fontRef idx="minor">
+            <a:schemeClr val="lt1"/>
+          </a:fontRef>
+        </p:style>
+        <p:txBody>
+          <a:bodyPr rtlCol="0" anchor="ctr"/>
+          <a:lstStyle/>
+          <a:p>
+            <a:r>
+              <a:rPr lang="en-US" sz="1600" dirty="0" err="1">
+                <a:solidFill>
+                  <a:schemeClr val="tx1"/>
+                </a:solidFill>
+              </a:rPr>
+              <a:t>rclcpp</a:t>
+            </a:r>
+            <a:endParaRPr kumimoji="1" lang="en-US" sz="1600" dirty="0">
+              <a:solidFill>
+                <a:schemeClr val="tx1"/>
+              </a:solidFill>
+            </a:endParaRPr>
+          </a:p>
+        </p:txBody>
+      </p:sp>
+      <p:sp>
+        <p:nvSpPr>
+          <p:cNvPr id="32" name="Rectangle 31">
+            <a:extLst>
+              <a:ext uri="{FF2B5EF4-FFF2-40B4-BE49-F238E27FC236}">
+                <a16:creationId xmlns:a16="http://schemas.microsoft.com/office/drawing/2014/main" id="{69D92B9D-D850-25B5-1C7D-67E9A19CF9BE}"/>
+              </a:ext>
+            </a:extLst>
+          </p:cNvPr>
+          <p:cNvSpPr/>
+          <p:nvPr/>
+        </p:nvSpPr>
+        <p:spPr>
+          <a:xfrm>
+            <a:off x="2141910" y="2637707"/>
+            <a:ext cx="7056784" cy="1008112"/>
+          </a:xfrm>
+          <a:prstGeom prst="rect">
+            <a:avLst/>
+          </a:prstGeom>
+          <a:solidFill>
+            <a:srgbClr val="FFFF00">
+              <a:alpha val="20000"/>
+            </a:srgbClr>
+          </a:solidFill>
+          <a:ln>
+            <a:solidFill>
+              <a:schemeClr val="tx1"/>
+            </a:solidFill>
+          </a:ln>
+        </p:spPr>
+        <p:style>
+          <a:lnRef idx="2">
+            <a:schemeClr val="accent1">
+              <a:shade val="50000"/>
+            </a:schemeClr>
+          </a:lnRef>
+          <a:fillRef idx="1">
+            <a:schemeClr val="accent1"/>
+          </a:fillRef>
+          <a:effectRef idx="0">
+            <a:schemeClr val="accent1"/>
+          </a:effectRef>
+          <a:fontRef idx="minor">
+            <a:schemeClr val="lt1"/>
+          </a:fontRef>
+        </p:style>
+        <p:txBody>
+          <a:bodyPr rtlCol="0" anchor="ctr"/>
+          <a:lstStyle/>
+          <a:p>
+            <a:r>
+              <a:rPr lang="en-US" sz="1400" dirty="0">
+                <a:solidFill>
+                  <a:schemeClr val="tx1"/>
+                </a:solidFill>
+              </a:rPr>
+              <a:t>+ Initialization of </a:t>
+            </a:r>
+            <a:r>
+              <a:rPr lang="en-US" sz="1400" dirty="0" err="1">
+                <a:solidFill>
+                  <a:schemeClr val="tx1"/>
+                </a:solidFill>
+              </a:rPr>
+              <a:t>rcutils</a:t>
+            </a:r>
+            <a:r>
+              <a:rPr lang="en-US" sz="1400" dirty="0">
+                <a:solidFill>
+                  <a:schemeClr val="tx1"/>
+                </a:solidFill>
+              </a:rPr>
+              <a:t> logging (console logging)</a:t>
+            </a:r>
+          </a:p>
+          <a:p>
+            <a:r>
+              <a:rPr lang="en-US" sz="1400" dirty="0">
+                <a:solidFill>
+                  <a:schemeClr val="tx1"/>
+                </a:solidFill>
+              </a:rPr>
+              <a:t>+ Initialization of </a:t>
+            </a:r>
+            <a:r>
+              <a:rPr lang="en-US" sz="1400" dirty="0" err="1">
+                <a:solidFill>
+                  <a:schemeClr val="tx1"/>
+                </a:solidFill>
+              </a:rPr>
+              <a:t>rcl_logging</a:t>
+            </a:r>
+            <a:r>
+              <a:rPr lang="en-US" sz="1400" dirty="0">
+                <a:solidFill>
+                  <a:schemeClr val="tx1"/>
+                </a:solidFill>
+              </a:rPr>
+              <a:t> (</a:t>
+            </a:r>
+            <a:r>
+              <a:rPr lang="en-US" sz="1400" dirty="0" err="1">
+                <a:solidFill>
+                  <a:schemeClr val="tx1"/>
+                </a:solidFill>
+              </a:rPr>
+              <a:t>spdlog</a:t>
+            </a:r>
+            <a:r>
+              <a:rPr lang="en-US" sz="1400" dirty="0">
+                <a:solidFill>
+                  <a:schemeClr val="tx1"/>
+                </a:solidFill>
+              </a:rPr>
+              <a:t> in default), either static link or dynamic loading</a:t>
+            </a:r>
+          </a:p>
+          <a:p>
+            <a:r>
+              <a:rPr lang="en-US" sz="1400" dirty="0">
+                <a:solidFill>
+                  <a:schemeClr val="tx1"/>
+                </a:solidFill>
+              </a:rPr>
+              <a:t>+ Creation of /</a:t>
+            </a:r>
+            <a:r>
+              <a:rPr lang="en-US" sz="1400" dirty="0" err="1">
+                <a:solidFill>
+                  <a:schemeClr val="tx1"/>
+                </a:solidFill>
+              </a:rPr>
+              <a:t>rosout</a:t>
+            </a:r>
+            <a:r>
+              <a:rPr lang="en-US" sz="1400" dirty="0">
+                <a:solidFill>
+                  <a:schemeClr val="tx1"/>
+                </a:solidFill>
+              </a:rPr>
+              <a:t> publisher (logging to network)</a:t>
+            </a:r>
+          </a:p>
+          <a:p>
+            <a:r>
+              <a:rPr lang="en-US" sz="1400" dirty="0">
+                <a:solidFill>
+                  <a:schemeClr val="tx1"/>
+                </a:solidFill>
+              </a:rPr>
+              <a:t>+ Callback for each logging message</a:t>
+            </a:r>
+          </a:p>
+        </p:txBody>
+      </p:sp>
+      <p:sp>
+        <p:nvSpPr>
+          <p:cNvPr id="33" name="Rectangle 32">
+            <a:extLst>
+              <a:ext uri="{FF2B5EF4-FFF2-40B4-BE49-F238E27FC236}">
+                <a16:creationId xmlns:a16="http://schemas.microsoft.com/office/drawing/2014/main" id="{438388AB-C90F-0494-65B0-7BFCCF423643}"/>
+              </a:ext>
+            </a:extLst>
+          </p:cNvPr>
+          <p:cNvSpPr/>
+          <p:nvPr/>
+        </p:nvSpPr>
+        <p:spPr>
+          <a:xfrm>
+            <a:off x="2141910" y="2277666"/>
+            <a:ext cx="7056782" cy="360040"/>
+          </a:xfrm>
+          <a:prstGeom prst="rect">
+            <a:avLst/>
+          </a:prstGeom>
+          <a:solidFill>
+            <a:schemeClr val="accent5">
+              <a:alpha val="20000"/>
+            </a:schemeClr>
+          </a:solidFill>
+          <a:ln>
+            <a:solidFill>
+              <a:schemeClr val="tx1"/>
+            </a:solidFill>
+          </a:ln>
+        </p:spPr>
+        <p:style>
+          <a:lnRef idx="2">
+            <a:schemeClr val="accent1">
+              <a:shade val="50000"/>
+            </a:schemeClr>
+          </a:lnRef>
+          <a:fillRef idx="1">
+            <a:schemeClr val="accent1"/>
+          </a:fillRef>
+          <a:effectRef idx="0">
+            <a:schemeClr val="accent1"/>
+          </a:effectRef>
+          <a:fontRef idx="minor">
+            <a:schemeClr val="lt1"/>
+          </a:fontRef>
+        </p:style>
+        <p:txBody>
+          <a:bodyPr rtlCol="0" anchor="ctr"/>
+          <a:lstStyle/>
+          <a:p>
+            <a:r>
+              <a:rPr lang="en-US" sz="1600" dirty="0" err="1">
+                <a:solidFill>
+                  <a:schemeClr val="tx1"/>
+                </a:solidFill>
+              </a:rPr>
+              <a:t>rcl</a:t>
+            </a:r>
+            <a:endParaRPr kumimoji="1" lang="en-US" sz="1600" dirty="0">
+              <a:solidFill>
+                <a:schemeClr val="tx1"/>
+              </a:solidFill>
+            </a:endParaRPr>
+          </a:p>
+        </p:txBody>
+      </p:sp>
+      <p:sp>
+        <p:nvSpPr>
+          <p:cNvPr id="34" name="Rectangle 33">
+            <a:extLst>
+              <a:ext uri="{FF2B5EF4-FFF2-40B4-BE49-F238E27FC236}">
+                <a16:creationId xmlns:a16="http://schemas.microsoft.com/office/drawing/2014/main" id="{D0AC636D-84F2-0CD4-57F7-956E021C6578}"/>
+              </a:ext>
+            </a:extLst>
+          </p:cNvPr>
+          <p:cNvSpPr/>
+          <p:nvPr/>
+        </p:nvSpPr>
+        <p:spPr>
+          <a:xfrm>
+            <a:off x="2130582" y="4221883"/>
+            <a:ext cx="3107674" cy="1728192"/>
+          </a:xfrm>
+          <a:prstGeom prst="rect">
+            <a:avLst/>
+          </a:prstGeom>
+          <a:solidFill>
+            <a:srgbClr val="FFFF00">
+              <a:alpha val="20000"/>
+            </a:srgbClr>
+          </a:solidFill>
+          <a:ln>
+            <a:solidFill>
+              <a:schemeClr val="tx1"/>
+            </a:solidFill>
+          </a:ln>
+        </p:spPr>
+        <p:style>
+          <a:lnRef idx="2">
+            <a:schemeClr val="accent1">
+              <a:shade val="50000"/>
+            </a:schemeClr>
+          </a:lnRef>
+          <a:fillRef idx="1">
+            <a:schemeClr val="accent1"/>
+          </a:fillRef>
+          <a:effectRef idx="0">
+            <a:schemeClr val="accent1"/>
+          </a:effectRef>
+          <a:fontRef idx="minor">
+            <a:schemeClr val="lt1"/>
+          </a:fontRef>
+        </p:style>
+        <p:txBody>
+          <a:bodyPr rtlCol="0" anchor="ctr"/>
+          <a:lstStyle/>
+          <a:p>
+            <a:r>
+              <a:rPr lang="en-US" sz="1400" dirty="0">
+                <a:solidFill>
+                  <a:schemeClr val="tx1"/>
+                </a:solidFill>
+              </a:rPr>
+              <a:t>+ Complete console logging implementation</a:t>
+            </a:r>
+          </a:p>
+        </p:txBody>
+      </p:sp>
+      <p:sp>
+        <p:nvSpPr>
+          <p:cNvPr id="35" name="Rectangle 34">
+            <a:extLst>
+              <a:ext uri="{FF2B5EF4-FFF2-40B4-BE49-F238E27FC236}">
+                <a16:creationId xmlns:a16="http://schemas.microsoft.com/office/drawing/2014/main" id="{D0969573-07CA-A5BC-8F2B-DD46E4B00066}"/>
+              </a:ext>
+            </a:extLst>
+          </p:cNvPr>
+          <p:cNvSpPr/>
+          <p:nvPr/>
+        </p:nvSpPr>
+        <p:spPr>
+          <a:xfrm>
+            <a:off x="2130581" y="3861842"/>
+            <a:ext cx="3107673" cy="360040"/>
+          </a:xfrm>
+          <a:prstGeom prst="rect">
+            <a:avLst/>
+          </a:prstGeom>
+          <a:solidFill>
+            <a:schemeClr val="accent5">
+              <a:alpha val="20000"/>
+            </a:schemeClr>
+          </a:solidFill>
+          <a:ln>
+            <a:solidFill>
+              <a:schemeClr val="tx1"/>
+            </a:solidFill>
+          </a:ln>
+        </p:spPr>
+        <p:style>
+          <a:lnRef idx="2">
+            <a:schemeClr val="accent1">
+              <a:shade val="50000"/>
+            </a:schemeClr>
+          </a:lnRef>
+          <a:fillRef idx="1">
+            <a:schemeClr val="accent1"/>
+          </a:fillRef>
+          <a:effectRef idx="0">
+            <a:schemeClr val="accent1"/>
+          </a:effectRef>
+          <a:fontRef idx="minor">
+            <a:schemeClr val="lt1"/>
+          </a:fontRef>
+        </p:style>
+        <p:txBody>
+          <a:bodyPr rtlCol="0" anchor="ctr"/>
+          <a:lstStyle/>
+          <a:p>
+            <a:r>
+              <a:rPr kumimoji="1" lang="en-US" sz="1600" dirty="0" err="1">
+                <a:solidFill>
+                  <a:schemeClr val="tx1"/>
+                </a:solidFill>
+              </a:rPr>
+              <a:t>rcutils</a:t>
+            </a:r>
+            <a:endParaRPr kumimoji="1" lang="en-US" sz="1600" dirty="0">
+              <a:solidFill>
+                <a:schemeClr val="tx1"/>
+              </a:solidFill>
+            </a:endParaRPr>
+          </a:p>
+        </p:txBody>
+      </p:sp>
+      <p:sp>
+        <p:nvSpPr>
+          <p:cNvPr id="36" name="Rectangle 35">
+            <a:extLst>
+              <a:ext uri="{FF2B5EF4-FFF2-40B4-BE49-F238E27FC236}">
+                <a16:creationId xmlns:a16="http://schemas.microsoft.com/office/drawing/2014/main" id="{337A7B97-21A8-3782-8DE1-060087DF65C0}"/>
+              </a:ext>
+            </a:extLst>
+          </p:cNvPr>
+          <p:cNvSpPr/>
+          <p:nvPr/>
+        </p:nvSpPr>
+        <p:spPr>
+          <a:xfrm>
+            <a:off x="5382271" y="4221882"/>
+            <a:ext cx="3816421" cy="576065"/>
+          </a:xfrm>
+          <a:prstGeom prst="rect">
+            <a:avLst/>
+          </a:prstGeom>
+          <a:solidFill>
+            <a:srgbClr val="FFFF00">
+              <a:alpha val="20000"/>
+            </a:srgbClr>
+          </a:solidFill>
+          <a:ln>
+            <a:solidFill>
+              <a:schemeClr val="tx1"/>
+            </a:solidFill>
+          </a:ln>
+        </p:spPr>
+        <p:style>
+          <a:lnRef idx="2">
+            <a:schemeClr val="accent1">
+              <a:shade val="50000"/>
+            </a:schemeClr>
+          </a:lnRef>
+          <a:fillRef idx="1">
+            <a:schemeClr val="accent1"/>
+          </a:fillRef>
+          <a:effectRef idx="0">
+            <a:schemeClr val="accent1"/>
+          </a:effectRef>
+          <a:fontRef idx="minor">
+            <a:schemeClr val="lt1"/>
+          </a:fontRef>
+        </p:style>
+        <p:txBody>
+          <a:bodyPr rtlCol="0" anchor="ctr"/>
+          <a:lstStyle/>
+          <a:p>
+            <a:r>
+              <a:rPr lang="en-US" sz="1400" dirty="0">
+                <a:solidFill>
+                  <a:schemeClr val="tx1"/>
+                </a:solidFill>
+              </a:rPr>
+              <a:t>+ Complete dynamic loading abstraction to </a:t>
+            </a:r>
+          </a:p>
+        </p:txBody>
+      </p:sp>
+      <p:sp>
+        <p:nvSpPr>
+          <p:cNvPr id="37" name="Rectangle 36">
+            <a:extLst>
+              <a:ext uri="{FF2B5EF4-FFF2-40B4-BE49-F238E27FC236}">
+                <a16:creationId xmlns:a16="http://schemas.microsoft.com/office/drawing/2014/main" id="{888C3545-B797-D1B7-B5B2-4C746EEAC30F}"/>
+              </a:ext>
+            </a:extLst>
+          </p:cNvPr>
+          <p:cNvSpPr/>
+          <p:nvPr/>
+        </p:nvSpPr>
+        <p:spPr>
+          <a:xfrm>
+            <a:off x="5382272" y="3861841"/>
+            <a:ext cx="3816420" cy="360040"/>
+          </a:xfrm>
+          <a:prstGeom prst="rect">
+            <a:avLst/>
+          </a:prstGeom>
+          <a:solidFill>
+            <a:schemeClr val="accent5">
+              <a:alpha val="20000"/>
+            </a:schemeClr>
+          </a:solidFill>
+          <a:ln>
+            <a:solidFill>
+              <a:schemeClr val="tx1"/>
+            </a:solidFill>
+          </a:ln>
+        </p:spPr>
+        <p:style>
+          <a:lnRef idx="2">
+            <a:schemeClr val="accent1">
+              <a:shade val="50000"/>
+            </a:schemeClr>
+          </a:lnRef>
+          <a:fillRef idx="1">
+            <a:schemeClr val="accent1"/>
+          </a:fillRef>
+          <a:effectRef idx="0">
+            <a:schemeClr val="accent1"/>
+          </a:effectRef>
+          <a:fontRef idx="minor">
+            <a:schemeClr val="lt1"/>
+          </a:fontRef>
+        </p:style>
+        <p:txBody>
+          <a:bodyPr rtlCol="0" anchor="ctr"/>
+          <a:lstStyle/>
+          <a:p>
+            <a:r>
+              <a:rPr lang="en-US" sz="1600" dirty="0" err="1">
+                <a:solidFill>
+                  <a:schemeClr val="tx1"/>
+                </a:solidFill>
+              </a:rPr>
+              <a:t>rcl_logging_implementation</a:t>
+            </a:r>
+            <a:endParaRPr kumimoji="1" lang="en-US" sz="1600" dirty="0">
+              <a:solidFill>
+                <a:schemeClr val="tx1"/>
+              </a:solidFill>
+            </a:endParaRPr>
+          </a:p>
+        </p:txBody>
+      </p:sp>
+      <p:sp>
+        <p:nvSpPr>
+          <p:cNvPr id="38" name="Rectangle 37">
+            <a:extLst>
+              <a:ext uri="{FF2B5EF4-FFF2-40B4-BE49-F238E27FC236}">
+                <a16:creationId xmlns:a16="http://schemas.microsoft.com/office/drawing/2014/main" id="{2DD1A97A-3FE4-21F5-11F1-9A4599B56BAD}"/>
+              </a:ext>
+            </a:extLst>
+          </p:cNvPr>
+          <p:cNvSpPr/>
+          <p:nvPr/>
+        </p:nvSpPr>
+        <p:spPr>
+          <a:xfrm>
+            <a:off x="5382270" y="5374010"/>
+            <a:ext cx="3816421" cy="576065"/>
+          </a:xfrm>
+          <a:prstGeom prst="rect">
+            <a:avLst/>
+          </a:prstGeom>
+          <a:solidFill>
+            <a:srgbClr val="FFFF00">
+              <a:alpha val="20000"/>
+            </a:srgbClr>
+          </a:solidFill>
+          <a:ln>
+            <a:solidFill>
+              <a:schemeClr val="tx1"/>
+            </a:solidFill>
+          </a:ln>
+        </p:spPr>
+        <p:style>
+          <a:lnRef idx="2">
+            <a:schemeClr val="accent1">
+              <a:shade val="50000"/>
+            </a:schemeClr>
+          </a:lnRef>
+          <a:fillRef idx="1">
+            <a:schemeClr val="accent1"/>
+          </a:fillRef>
+          <a:effectRef idx="0">
+            <a:schemeClr val="accent1"/>
+          </a:effectRef>
+          <a:fontRef idx="minor">
+            <a:schemeClr val="lt1"/>
+          </a:fontRef>
+        </p:style>
+        <p:txBody>
+          <a:bodyPr rtlCol="0" anchor="ctr"/>
+          <a:lstStyle/>
+          <a:p>
+            <a:r>
+              <a:rPr lang="en-US" sz="1400" dirty="0">
+                <a:solidFill>
+                  <a:schemeClr val="tx1"/>
+                </a:solidFill>
+              </a:rPr>
+              <a:t>+ Initialization of disk logging</a:t>
+            </a:r>
+          </a:p>
+          <a:p>
+            <a:r>
+              <a:rPr lang="en-US" sz="1400" dirty="0">
+                <a:solidFill>
+                  <a:schemeClr val="tx1"/>
+                </a:solidFill>
+              </a:rPr>
+              <a:t>+ Interface between disk logging and </a:t>
+            </a:r>
+            <a:r>
+              <a:rPr lang="en-US" sz="1400" dirty="0" err="1">
+                <a:solidFill>
+                  <a:schemeClr val="tx1"/>
+                </a:solidFill>
+              </a:rPr>
+              <a:t>rcl</a:t>
+            </a:r>
+            <a:endParaRPr lang="en-US" sz="1400" dirty="0">
+              <a:solidFill>
+                <a:schemeClr val="tx1"/>
+              </a:solidFill>
+            </a:endParaRPr>
+          </a:p>
+        </p:txBody>
+      </p:sp>
+      <p:sp>
+        <p:nvSpPr>
+          <p:cNvPr id="39" name="Rectangle 38">
+            <a:extLst>
+              <a:ext uri="{FF2B5EF4-FFF2-40B4-BE49-F238E27FC236}">
+                <a16:creationId xmlns:a16="http://schemas.microsoft.com/office/drawing/2014/main" id="{66EDCBE5-FC10-63D0-432C-49F96450CCF1}"/>
+              </a:ext>
+            </a:extLst>
+          </p:cNvPr>
+          <p:cNvSpPr/>
+          <p:nvPr/>
+        </p:nvSpPr>
+        <p:spPr>
+          <a:xfrm>
+            <a:off x="5382271" y="5013969"/>
+            <a:ext cx="3816420" cy="360040"/>
+          </a:xfrm>
+          <a:prstGeom prst="rect">
+            <a:avLst/>
+          </a:prstGeom>
+          <a:solidFill>
+            <a:schemeClr val="accent5">
+              <a:alpha val="20000"/>
+            </a:schemeClr>
+          </a:solidFill>
+          <a:ln>
+            <a:solidFill>
+              <a:schemeClr val="tx1"/>
+            </a:solidFill>
+          </a:ln>
+        </p:spPr>
+        <p:style>
+          <a:lnRef idx="2">
+            <a:schemeClr val="accent1">
+              <a:shade val="50000"/>
+            </a:schemeClr>
+          </a:lnRef>
+          <a:fillRef idx="1">
+            <a:schemeClr val="accent1"/>
+          </a:fillRef>
+          <a:effectRef idx="0">
+            <a:schemeClr val="accent1"/>
+          </a:effectRef>
+          <a:fontRef idx="minor">
+            <a:schemeClr val="lt1"/>
+          </a:fontRef>
+        </p:style>
+        <p:txBody>
+          <a:bodyPr rtlCol="0" anchor="ctr"/>
+          <a:lstStyle/>
+          <a:p>
+            <a:r>
+              <a:rPr lang="en-US" sz="1600" dirty="0" err="1">
+                <a:solidFill>
+                  <a:schemeClr val="tx1"/>
+                </a:solidFill>
+              </a:rPr>
+              <a:t>rcl_logging</a:t>
+            </a:r>
+            <a:r>
+              <a:rPr lang="en-US" sz="1600" dirty="0">
+                <a:solidFill>
+                  <a:schemeClr val="tx1"/>
+                </a:solidFill>
+              </a:rPr>
+              <a:t> (</a:t>
+            </a:r>
+            <a:r>
+              <a:rPr lang="en-US" sz="1600" dirty="0" err="1">
+                <a:solidFill>
+                  <a:schemeClr val="tx1"/>
+                </a:solidFill>
+              </a:rPr>
+              <a:t>rcl_logging_spdlog</a:t>
+            </a:r>
+            <a:r>
+              <a:rPr lang="en-US" sz="1600" dirty="0">
+                <a:solidFill>
+                  <a:schemeClr val="tx1"/>
+                </a:solidFill>
+              </a:rPr>
+              <a:t>)</a:t>
+            </a:r>
+            <a:endParaRPr kumimoji="1" lang="en-US" sz="1600" dirty="0">
+              <a:solidFill>
+                <a:schemeClr val="tx1"/>
+              </a:solidFill>
+            </a:endParaRPr>
+          </a:p>
+        </p:txBody>
+      </p:sp>
+    </p:spTree>
+    <p:extLst>
+      <p:ext uri="{BB962C8B-B14F-4D97-AF65-F5344CB8AC3E}">
+        <p14:creationId xmlns:p14="http://schemas.microsoft.com/office/powerpoint/2010/main" val="852688435"/>
+      </p:ext>
+    </p:extLst>
+  </p:cSld>
+  <p:clrMapOvr>
+    <a:masterClrMapping/>
+  </p:clrMapOvr>
+  <mc:AlternateContent xmlns:mc="http://schemas.openxmlformats.org/markup-compatibility/2006" xmlns:p14="http://schemas.microsoft.com/office/powerpoint/2010/main">
+    <mc:Choice Requires="p14">
+      <p:transition spd="med" p14:dur="700">
+        <p:fade/>
+      </p:transition>
+    </mc:Choice>
+    <mc:Fallback xmlns="">
+      <p:transition xmlns:p14="http://schemas.microsoft.com/office/powerpoint/2010/main" spd="med">
+        <p:fade/>
+      </p:transition>
+    </mc:Fallback>
+  </mc:AlternateContent>
+  <p:timing>
+    <p:tnLst>
+      <p:par>
+        <p:cTn id="1" dur="indefinite" restart="never" nodeType="tmRoot">
+          <p:childTnLst>
+            <p:seq concurrent="1" nextAc="seek">
+              <p:cTn id="2" dur="indefinite" nodeType="mainSeq">
+                <p:childTnLst>
+                  <p:par>
+                    <p:cTn id="3" fill="hold">
+                      <p:stCondLst>
+                        <p:cond delay="indefinite"/>
+                        <p:cond evt="onBegin" delay="0">
+                          <p:tn val="2"/>
+                        </p:cond>
+                      </p:stCondLst>
+                      <p:childTnLst>
+                        <p:par>
+                          <p:cTn id="4" fill="hold">
+                            <p:stCondLst>
+                              <p:cond delay="0"/>
+                            </p:stCondLst>
+                            <p:childTnLst>
+                              <p:par>
+                                <p:cTn id="5" presetID="16" presetClass="entr" presetSubtype="21" fill="hold" grpId="0" nodeType="withEffect">
+                                  <p:stCondLst>
+                                    <p:cond delay="1000"/>
+                                  </p:stCondLst>
+                                  <p:childTnLst>
+                                    <p:set>
+                                      <p:cBhvr>
+                                        <p:cTn id="6" dur="1" fill="hold">
+                                          <p:stCondLst>
+                                            <p:cond delay="0"/>
+                                          </p:stCondLst>
+                                        </p:cTn>
+                                        <p:tgtEl>
+                                          <p:spTgt spid="4"/>
+                                        </p:tgtEl>
+                                        <p:attrNameLst>
+                                          <p:attrName>style.visibility</p:attrName>
+                                        </p:attrNameLst>
+                                      </p:cBhvr>
+                                      <p:to>
+                                        <p:strVal val="visible"/>
+                                      </p:to>
+                                    </p:set>
+                                    <p:animEffect transition="in" filter="barn(inVertical)">
+                                      <p:cBhvr>
+                                        <p:cTn id="7" dur="2000"/>
+                                        <p:tgtEl>
+                                          <p:spTgt spid="4"/>
+                                        </p:tgtEl>
+                                      </p:cBhvr>
+                                    </p:animEffect>
+                                  </p:childTnLst>
+                                </p:cTn>
+                              </p:par>
+                              <p:par>
+                                <p:cTn id="8" presetID="16" presetClass="entr" presetSubtype="21" fill="hold" grpId="0" nodeType="withEffect">
+                                  <p:stCondLst>
+                                    <p:cond delay="1000"/>
+                                  </p:stCondLst>
+                                  <p:childTnLst>
+                                    <p:set>
+                                      <p:cBhvr>
+                                        <p:cTn id="9" dur="1" fill="hold">
+                                          <p:stCondLst>
+                                            <p:cond delay="0"/>
+                                          </p:stCondLst>
+                                        </p:cTn>
+                                        <p:tgtEl>
+                                          <p:spTgt spid="6"/>
+                                        </p:tgtEl>
+                                        <p:attrNameLst>
+                                          <p:attrName>style.visibility</p:attrName>
+                                        </p:attrNameLst>
+                                      </p:cBhvr>
+                                      <p:to>
+                                        <p:strVal val="visible"/>
+                                      </p:to>
+                                    </p:set>
+                                    <p:animEffect transition="in" filter="barn(inVertical)">
+                                      <p:cBhvr>
+                                        <p:cTn id="10" dur="2000"/>
+                                        <p:tgtEl>
+                                          <p:spTgt spid="6"/>
+                                        </p:tgtEl>
+                                      </p:cBhvr>
+                                    </p:animEffect>
+                                  </p:childTnLst>
+                                </p:cTn>
+                              </p:par>
+                              <p:par>
+                                <p:cTn id="11" presetID="16" presetClass="entr" presetSubtype="21" fill="hold" grpId="0" nodeType="withEffect">
+                                  <p:stCondLst>
+                                    <p:cond delay="1000"/>
+                                  </p:stCondLst>
+                                  <p:childTnLst>
+                                    <p:set>
+                                      <p:cBhvr>
+                                        <p:cTn id="12" dur="1" fill="hold">
+                                          <p:stCondLst>
+                                            <p:cond delay="0"/>
+                                          </p:stCondLst>
+                                        </p:cTn>
+                                        <p:tgtEl>
+                                          <p:spTgt spid="33"/>
+                                        </p:tgtEl>
+                                        <p:attrNameLst>
+                                          <p:attrName>style.visibility</p:attrName>
+                                        </p:attrNameLst>
+                                      </p:cBhvr>
+                                      <p:to>
+                                        <p:strVal val="visible"/>
+                                      </p:to>
+                                    </p:set>
+                                    <p:animEffect transition="in" filter="barn(inVertical)">
+                                      <p:cBhvr>
+                                        <p:cTn id="13" dur="2000"/>
+                                        <p:tgtEl>
+                                          <p:spTgt spid="33"/>
+                                        </p:tgtEl>
+                                      </p:cBhvr>
+                                    </p:animEffect>
+                                  </p:childTnLst>
+                                </p:cTn>
+                              </p:par>
+                              <p:par>
+                                <p:cTn id="14" presetID="16" presetClass="entr" presetSubtype="21" fill="hold" grpId="0" nodeType="withEffect">
+                                  <p:stCondLst>
+                                    <p:cond delay="1000"/>
+                                  </p:stCondLst>
+                                  <p:childTnLst>
+                                    <p:set>
+                                      <p:cBhvr>
+                                        <p:cTn id="15" dur="1" fill="hold">
+                                          <p:stCondLst>
+                                            <p:cond delay="0"/>
+                                          </p:stCondLst>
+                                        </p:cTn>
+                                        <p:tgtEl>
+                                          <p:spTgt spid="35"/>
+                                        </p:tgtEl>
+                                        <p:attrNameLst>
+                                          <p:attrName>style.visibility</p:attrName>
+                                        </p:attrNameLst>
+                                      </p:cBhvr>
+                                      <p:to>
+                                        <p:strVal val="visible"/>
+                                      </p:to>
+                                    </p:set>
+                                    <p:animEffect transition="in" filter="barn(inVertical)">
+                                      <p:cBhvr>
+                                        <p:cTn id="16" dur="2000"/>
+                                        <p:tgtEl>
+                                          <p:spTgt spid="35"/>
+                                        </p:tgtEl>
+                                      </p:cBhvr>
+                                    </p:animEffect>
+                                  </p:childTnLst>
+                                </p:cTn>
+                              </p:par>
+                              <p:par>
+                                <p:cTn id="17" presetID="16" presetClass="entr" presetSubtype="21" fill="hold" grpId="0" nodeType="withEffect">
+                                  <p:stCondLst>
+                                    <p:cond delay="1000"/>
+                                  </p:stCondLst>
+                                  <p:childTnLst>
+                                    <p:set>
+                                      <p:cBhvr>
+                                        <p:cTn id="18" dur="1" fill="hold">
+                                          <p:stCondLst>
+                                            <p:cond delay="0"/>
+                                          </p:stCondLst>
+                                        </p:cTn>
+                                        <p:tgtEl>
+                                          <p:spTgt spid="37"/>
+                                        </p:tgtEl>
+                                        <p:attrNameLst>
+                                          <p:attrName>style.visibility</p:attrName>
+                                        </p:attrNameLst>
+                                      </p:cBhvr>
+                                      <p:to>
+                                        <p:strVal val="visible"/>
+                                      </p:to>
+                                    </p:set>
+                                    <p:animEffect transition="in" filter="barn(inVertical)">
+                                      <p:cBhvr>
+                                        <p:cTn id="19" dur="2000"/>
+                                        <p:tgtEl>
+                                          <p:spTgt spid="37"/>
+                                        </p:tgtEl>
+                                      </p:cBhvr>
+                                    </p:animEffect>
+                                  </p:childTnLst>
+                                </p:cTn>
+                              </p:par>
+                              <p:par>
+                                <p:cTn id="20" presetID="16" presetClass="entr" presetSubtype="21" fill="hold" grpId="0" nodeType="withEffect">
+                                  <p:stCondLst>
+                                    <p:cond delay="1000"/>
+                                  </p:stCondLst>
+                                  <p:childTnLst>
+                                    <p:set>
+                                      <p:cBhvr>
+                                        <p:cTn id="21" dur="1" fill="hold">
+                                          <p:stCondLst>
+                                            <p:cond delay="0"/>
+                                          </p:stCondLst>
+                                        </p:cTn>
+                                        <p:tgtEl>
+                                          <p:spTgt spid="39"/>
+                                        </p:tgtEl>
+                                        <p:attrNameLst>
+                                          <p:attrName>style.visibility</p:attrName>
+                                        </p:attrNameLst>
+                                      </p:cBhvr>
+                                      <p:to>
+                                        <p:strVal val="visible"/>
+                                      </p:to>
+                                    </p:set>
+                                    <p:animEffect transition="in" filter="barn(inVertical)">
+                                      <p:cBhvr>
+                                        <p:cTn id="22" dur="2000"/>
+                                        <p:tgtEl>
+                                          <p:spTgt spid="39"/>
+                                        </p:tgtEl>
+                                      </p:cBhvr>
+                                    </p:animEffect>
+                                  </p:childTnLst>
+                                </p:cTn>
+                              </p:par>
+                            </p:childTnLst>
+                          </p:cTn>
+                        </p:par>
+                      </p:childTnLst>
+                    </p:cTn>
+                  </p:par>
+                </p:childTnLst>
+              </p:cTn>
+              <p:prevCondLst>
+                <p:cond evt="onPrev" delay="0">
+                  <p:tgtEl>
+                    <p:sldTgt/>
+                  </p:tgtEl>
+                </p:cond>
+              </p:prevCondLst>
+              <p:nextCondLst>
+                <p:cond evt="onNext" delay="0">
+                  <p:tgtEl>
+                    <p:sldTgt/>
+                  </p:tgtEl>
+                </p:cond>
+              </p:nextCondLst>
+            </p:seq>
+          </p:childTnLst>
+        </p:cTn>
+      </p:par>
+    </p:tnLst>
+    <p:bldLst>
+      <p:bldP spid="4" grpId="0" animBg="1"/>
+      <p:bldP spid="6" grpId="0" animBg="1"/>
+      <p:bldP spid="33" grpId="0" animBg="1"/>
+      <p:bldP spid="35" grpId="0" animBg="1"/>
+      <p:bldP spid="37" grpId="0" animBg="1"/>
+      <p:bldP spid="39" grpId="0" animBg="1"/>
+    </p:bldLst>
+  </p:timing>
+</p:sld>
+</file>
+
+<file path=ppt/slides/slide16.xml><?xml version="1.0" encoding="utf-8"?>
+<p:sld xmlns:a="http://schemas.openxmlformats.org/drawingml/2006/main" xmlns:r="http://schemas.openxmlformats.org/officeDocument/2006/relationships" xmlns:p="http://schemas.openxmlformats.org/presentationml/2006/main">
+  <p:cSld>
+    <p:spTree>
+      <p:nvGrpSpPr>
+        <p:cNvPr id="1" name=""/>
+        <p:cNvGrpSpPr/>
+        <p:nvPr/>
+      </p:nvGrpSpPr>
+      <p:grpSpPr>
+        <a:xfrm>
+          <a:off x="0" y="0"/>
+          <a:ext cx="0" cy="0"/>
+          <a:chOff x="0" y="0"/>
+          <a:chExt cx="0" cy="0"/>
+        </a:xfrm>
+      </p:grpSpPr>
+      <p:sp>
+        <p:nvSpPr>
+          <p:cNvPr id="2" name="Rectangle 1">
+            <a:extLst>
+              <a:ext uri="{FF2B5EF4-FFF2-40B4-BE49-F238E27FC236}">
+                <a16:creationId xmlns:a16="http://schemas.microsoft.com/office/drawing/2014/main" id="{FED6D263-6782-54D5-7C01-537D90A40C12}"/>
+              </a:ext>
+            </a:extLst>
+          </p:cNvPr>
+          <p:cNvSpPr/>
+          <p:nvPr/>
+        </p:nvSpPr>
+        <p:spPr>
+          <a:xfrm>
+            <a:off x="1853878" y="2563664"/>
+            <a:ext cx="3462067" cy="2155562"/>
+          </a:xfrm>
+          <a:prstGeom prst="rect">
+            <a:avLst/>
+          </a:prstGeom>
+        </p:spPr>
+        <p:style>
+          <a:lnRef idx="2">
+            <a:schemeClr val="accent1"/>
+          </a:lnRef>
+          <a:fillRef idx="1">
+            <a:schemeClr val="lt1"/>
+          </a:fillRef>
+          <a:effectRef idx="0">
+            <a:schemeClr val="accent1"/>
+          </a:effectRef>
+          <a:fontRef idx="minor">
+            <a:schemeClr val="dk1"/>
+          </a:fontRef>
+        </p:style>
+        <p:txBody>
+          <a:bodyPr rtlCol="0" anchor="ctr"/>
+          <a:lstStyle/>
+          <a:p>
+            <a:pPr algn="ctr"/>
+            <a:r>
+              <a:rPr lang="en-US" altLang="ja-JP" dirty="0" err="1"/>
+              <a:t>rcl</a:t>
+            </a:r>
+            <a:endParaRPr lang="en-US" altLang="ja-JP" dirty="0"/>
+          </a:p>
+          <a:p>
+            <a:pPr algn="ctr"/>
+            <a:endParaRPr lang="en-US" altLang="ja-JP" dirty="0"/>
+          </a:p>
+          <a:p>
+            <a:pPr algn="ctr"/>
+            <a:endParaRPr lang="en-US" altLang="ja-JP" dirty="0"/>
+          </a:p>
+          <a:p>
+            <a:pPr algn="ctr"/>
+            <a:endParaRPr lang="en-US" altLang="ja-JP" dirty="0"/>
+          </a:p>
+          <a:p>
+            <a:pPr algn="ctr"/>
+            <a:endParaRPr lang="en-US" altLang="ja-JP" dirty="0"/>
+          </a:p>
+          <a:p>
+            <a:pPr algn="ctr"/>
+            <a:endParaRPr lang="en-US" altLang="ja-JP" dirty="0"/>
+          </a:p>
+          <a:p>
+            <a:pPr algn="ctr"/>
+            <a:endParaRPr kumimoji="1" lang="ja-JP" altLang="en-US" dirty="0"/>
+          </a:p>
+        </p:txBody>
+      </p:sp>
+      <p:sp>
+        <p:nvSpPr>
+          <p:cNvPr id="3" name="Rectangle 2">
+            <a:extLst>
+              <a:ext uri="{FF2B5EF4-FFF2-40B4-BE49-F238E27FC236}">
+                <a16:creationId xmlns:a16="http://schemas.microsoft.com/office/drawing/2014/main" id="{AC5DA8B3-E19A-0AC5-A88A-82D9E12A60C6}"/>
+              </a:ext>
+            </a:extLst>
+          </p:cNvPr>
+          <p:cNvSpPr/>
+          <p:nvPr/>
+        </p:nvSpPr>
+        <p:spPr>
+          <a:xfrm>
+            <a:off x="2064906" y="2933509"/>
+            <a:ext cx="3062808" cy="496285"/>
+          </a:xfrm>
+          <a:prstGeom prst="rect">
+            <a:avLst/>
+          </a:prstGeom>
+        </p:spPr>
+        <p:style>
+          <a:lnRef idx="1">
+            <a:schemeClr val="accent4"/>
+          </a:lnRef>
+          <a:fillRef idx="2">
+            <a:schemeClr val="accent4"/>
+          </a:fillRef>
+          <a:effectRef idx="1">
+            <a:schemeClr val="accent4"/>
+          </a:effectRef>
+          <a:fontRef idx="minor">
+            <a:schemeClr val="dk1"/>
+          </a:fontRef>
+        </p:style>
+        <p:txBody>
+          <a:bodyPr rtlCol="0" anchor="ctr"/>
+          <a:lstStyle/>
+          <a:p>
+            <a:pPr algn="ctr"/>
+            <a:r>
+              <a:rPr lang="en-US" altLang="ja-JP" dirty="0" err="1"/>
+              <a:t>r</a:t>
+            </a:r>
+            <a:r>
+              <a:rPr kumimoji="1" lang="en-US" altLang="ja-JP" dirty="0" err="1"/>
+              <a:t>cl_logging_interface</a:t>
+            </a:r>
+            <a:endParaRPr kumimoji="1" lang="ja-JP" altLang="en-US" dirty="0"/>
+          </a:p>
+        </p:txBody>
+      </p:sp>
+      <p:sp>
+        <p:nvSpPr>
+          <p:cNvPr id="4" name="Rectangle 3">
+            <a:extLst>
+              <a:ext uri="{FF2B5EF4-FFF2-40B4-BE49-F238E27FC236}">
+                <a16:creationId xmlns:a16="http://schemas.microsoft.com/office/drawing/2014/main" id="{97FBBC5A-68F0-F171-1283-D666BC647E37}"/>
+              </a:ext>
+            </a:extLst>
+          </p:cNvPr>
+          <p:cNvSpPr/>
+          <p:nvPr/>
+        </p:nvSpPr>
+        <p:spPr>
+          <a:xfrm>
+            <a:off x="2070258" y="5119643"/>
+            <a:ext cx="3062808" cy="398383"/>
+          </a:xfrm>
+          <a:prstGeom prst="rect">
+            <a:avLst/>
+          </a:prstGeom>
+        </p:spPr>
+        <p:style>
+          <a:lnRef idx="2">
+            <a:schemeClr val="accent1"/>
+          </a:lnRef>
+          <a:fillRef idx="1">
+            <a:schemeClr val="lt1"/>
+          </a:fillRef>
+          <a:effectRef idx="0">
+            <a:schemeClr val="accent1"/>
+          </a:effectRef>
+          <a:fontRef idx="minor">
+            <a:schemeClr val="dk1"/>
+          </a:fontRef>
+        </p:style>
+        <p:txBody>
+          <a:bodyPr rtlCol="0" anchor="ctr"/>
+          <a:lstStyle/>
+          <a:p>
+            <a:pPr algn="ctr"/>
+            <a:r>
+              <a:rPr kumimoji="1" lang="en-US" altLang="ja-JP" dirty="0" err="1"/>
+              <a:t>spdlog</a:t>
+            </a:r>
+            <a:endParaRPr kumimoji="1" lang="ja-JP" altLang="en-US" dirty="0"/>
+          </a:p>
+        </p:txBody>
+      </p:sp>
+      <p:cxnSp>
+        <p:nvCxnSpPr>
+          <p:cNvPr id="5" name="Straight Arrow Connector 4">
+            <a:extLst>
+              <a:ext uri="{FF2B5EF4-FFF2-40B4-BE49-F238E27FC236}">
+                <a16:creationId xmlns:a16="http://schemas.microsoft.com/office/drawing/2014/main" id="{48DF8AA8-BCE9-29F0-F87D-65B3331AB9EF}"/>
+              </a:ext>
+            </a:extLst>
+          </p:cNvPr>
+          <p:cNvCxnSpPr>
+            <a:cxnSpLocks/>
+            <a:stCxn id="8" idx="2"/>
+            <a:endCxn id="4" idx="0"/>
+          </p:cNvCxnSpPr>
+          <p:nvPr/>
+        </p:nvCxnSpPr>
+        <p:spPr>
+          <a:xfrm>
+            <a:off x="3601662" y="4437353"/>
+            <a:ext cx="0" cy="682290"/>
+          </a:xfrm>
+          <a:prstGeom prst="straightConnector1">
+            <a:avLst/>
+          </a:prstGeom>
+          <a:ln>
+            <a:tailEnd type="triangle"/>
+          </a:ln>
+        </p:spPr>
+        <p:style>
+          <a:lnRef idx="1">
+            <a:schemeClr val="accent1"/>
+          </a:lnRef>
+          <a:fillRef idx="0">
+            <a:schemeClr val="accent1"/>
+          </a:fillRef>
+          <a:effectRef idx="0">
+            <a:schemeClr val="accent1"/>
+          </a:effectRef>
+          <a:fontRef idx="minor">
+            <a:schemeClr val="tx1"/>
+          </a:fontRef>
+        </p:style>
+      </p:cxnSp>
+      <p:sp>
+        <p:nvSpPr>
+          <p:cNvPr id="6" name="Rectangle 5">
+            <a:extLst>
+              <a:ext uri="{FF2B5EF4-FFF2-40B4-BE49-F238E27FC236}">
+                <a16:creationId xmlns:a16="http://schemas.microsoft.com/office/drawing/2014/main" id="{E7283869-2C6D-DDA7-AFF2-D1982EB7A240}"/>
+              </a:ext>
+            </a:extLst>
+          </p:cNvPr>
+          <p:cNvSpPr/>
+          <p:nvPr/>
+        </p:nvSpPr>
+        <p:spPr>
+          <a:xfrm>
+            <a:off x="1853878" y="1701602"/>
+            <a:ext cx="1511347" cy="509119"/>
+          </a:xfrm>
+          <a:prstGeom prst="rect">
+            <a:avLst/>
+          </a:prstGeom>
+        </p:spPr>
+        <p:style>
+          <a:lnRef idx="2">
+            <a:schemeClr val="accent1"/>
+          </a:lnRef>
+          <a:fillRef idx="1">
+            <a:schemeClr val="lt1"/>
+          </a:fillRef>
+          <a:effectRef idx="0">
+            <a:schemeClr val="accent1"/>
+          </a:effectRef>
+          <a:fontRef idx="minor">
+            <a:schemeClr val="dk1"/>
+          </a:fontRef>
+        </p:style>
+        <p:txBody>
+          <a:bodyPr rtlCol="0" anchor="ctr"/>
+          <a:lstStyle/>
+          <a:p>
+            <a:pPr algn="ctr"/>
+            <a:r>
+              <a:rPr kumimoji="1" lang="en-US" altLang="ja-JP" dirty="0"/>
+              <a:t>ROS app</a:t>
+            </a:r>
+            <a:endParaRPr kumimoji="1" lang="ja-JP" altLang="en-US" dirty="0"/>
+          </a:p>
+        </p:txBody>
+      </p:sp>
+      <p:sp>
+        <p:nvSpPr>
+          <p:cNvPr id="7" name="Rectangle 6">
+            <a:extLst>
+              <a:ext uri="{FF2B5EF4-FFF2-40B4-BE49-F238E27FC236}">
+                <a16:creationId xmlns:a16="http://schemas.microsoft.com/office/drawing/2014/main" id="{7B890019-B491-A289-EC44-C9466F7AD704}"/>
+              </a:ext>
+            </a:extLst>
+          </p:cNvPr>
+          <p:cNvSpPr/>
+          <p:nvPr/>
+        </p:nvSpPr>
+        <p:spPr>
+          <a:xfrm>
+            <a:off x="3804599" y="1701602"/>
+            <a:ext cx="1511347" cy="509119"/>
+          </a:xfrm>
+          <a:prstGeom prst="rect">
+            <a:avLst/>
+          </a:prstGeom>
+        </p:spPr>
+        <p:style>
+          <a:lnRef idx="2">
+            <a:schemeClr val="accent1"/>
+          </a:lnRef>
+          <a:fillRef idx="1">
+            <a:schemeClr val="lt1"/>
+          </a:fillRef>
+          <a:effectRef idx="0">
+            <a:schemeClr val="accent1"/>
+          </a:effectRef>
+          <a:fontRef idx="minor">
+            <a:schemeClr val="dk1"/>
+          </a:fontRef>
+        </p:style>
+        <p:txBody>
+          <a:bodyPr rtlCol="0" anchor="ctr"/>
+          <a:lstStyle/>
+          <a:p>
+            <a:pPr algn="ctr"/>
+            <a:r>
+              <a:rPr kumimoji="1" lang="en-US" altLang="ja-JP" dirty="0"/>
+              <a:t>ROS app</a:t>
+            </a:r>
+            <a:endParaRPr kumimoji="1" lang="ja-JP" altLang="en-US" dirty="0"/>
+          </a:p>
+        </p:txBody>
+      </p:sp>
+      <p:sp>
+        <p:nvSpPr>
+          <p:cNvPr id="8" name="Rectangle 7">
+            <a:extLst>
+              <a:ext uri="{FF2B5EF4-FFF2-40B4-BE49-F238E27FC236}">
+                <a16:creationId xmlns:a16="http://schemas.microsoft.com/office/drawing/2014/main" id="{744DA206-7EA5-717B-5EDD-0A8FEF7F9F04}"/>
+              </a:ext>
+            </a:extLst>
+          </p:cNvPr>
+          <p:cNvSpPr/>
+          <p:nvPr/>
+        </p:nvSpPr>
+        <p:spPr>
+          <a:xfrm>
+            <a:off x="2070258" y="3941068"/>
+            <a:ext cx="3062808" cy="496285"/>
+          </a:xfrm>
+          <a:prstGeom prst="rect">
+            <a:avLst/>
+          </a:prstGeom>
+        </p:spPr>
+        <p:style>
+          <a:lnRef idx="1">
+            <a:schemeClr val="accent4"/>
+          </a:lnRef>
+          <a:fillRef idx="2">
+            <a:schemeClr val="accent4"/>
+          </a:fillRef>
+          <a:effectRef idx="1">
+            <a:schemeClr val="accent4"/>
+          </a:effectRef>
+          <a:fontRef idx="minor">
+            <a:schemeClr val="dk1"/>
+          </a:fontRef>
+        </p:style>
+        <p:txBody>
+          <a:bodyPr rtlCol="0" anchor="ctr"/>
+          <a:lstStyle/>
+          <a:p>
+            <a:pPr algn="ctr"/>
+            <a:r>
+              <a:rPr lang="en-US" altLang="ja-JP" dirty="0" err="1"/>
+              <a:t>r</a:t>
+            </a:r>
+            <a:r>
+              <a:rPr kumimoji="1" lang="en-US" altLang="ja-JP" dirty="0" err="1"/>
+              <a:t>cl_logging_</a:t>
+            </a:r>
+            <a:r>
+              <a:rPr lang="en-US" altLang="ja-JP" dirty="0" err="1"/>
+              <a:t>spdlog</a:t>
+            </a:r>
+            <a:endParaRPr kumimoji="1" lang="ja-JP" altLang="en-US" dirty="0"/>
+          </a:p>
+        </p:txBody>
+      </p:sp>
+      <p:cxnSp>
+        <p:nvCxnSpPr>
+          <p:cNvPr id="9" name="Straight Arrow Connector 8">
+            <a:extLst>
+              <a:ext uri="{FF2B5EF4-FFF2-40B4-BE49-F238E27FC236}">
+                <a16:creationId xmlns:a16="http://schemas.microsoft.com/office/drawing/2014/main" id="{05421031-E0C7-5C21-2BF7-3D4D9CA83568}"/>
+              </a:ext>
+            </a:extLst>
+          </p:cNvPr>
+          <p:cNvCxnSpPr>
+            <a:cxnSpLocks/>
+            <a:stCxn id="3" idx="2"/>
+            <a:endCxn id="8" idx="0"/>
+          </p:cNvCxnSpPr>
+          <p:nvPr/>
+        </p:nvCxnSpPr>
+        <p:spPr>
+          <a:xfrm>
+            <a:off x="3596310" y="3429794"/>
+            <a:ext cx="5352" cy="511274"/>
+          </a:xfrm>
+          <a:prstGeom prst="straightConnector1">
+            <a:avLst/>
+          </a:prstGeom>
+          <a:ln>
+            <a:tailEnd type="triangle"/>
+          </a:ln>
+        </p:spPr>
+        <p:style>
+          <a:lnRef idx="1">
+            <a:schemeClr val="accent1"/>
+          </a:lnRef>
+          <a:fillRef idx="0">
+            <a:schemeClr val="accent1"/>
+          </a:fillRef>
+          <a:effectRef idx="0">
+            <a:schemeClr val="accent1"/>
+          </a:effectRef>
+          <a:fontRef idx="minor">
+            <a:schemeClr val="tx1"/>
+          </a:fontRef>
+        </p:style>
+      </p:cxnSp>
+      <p:cxnSp>
+        <p:nvCxnSpPr>
+          <p:cNvPr id="10" name="Straight Arrow Connector 9">
+            <a:extLst>
+              <a:ext uri="{FF2B5EF4-FFF2-40B4-BE49-F238E27FC236}">
+                <a16:creationId xmlns:a16="http://schemas.microsoft.com/office/drawing/2014/main" id="{57B6297E-51A1-D9C7-869F-D0368829E35C}"/>
+              </a:ext>
+            </a:extLst>
+          </p:cNvPr>
+          <p:cNvCxnSpPr>
+            <a:cxnSpLocks/>
+            <a:stCxn id="6" idx="2"/>
+          </p:cNvCxnSpPr>
+          <p:nvPr/>
+        </p:nvCxnSpPr>
+        <p:spPr>
+          <a:xfrm>
+            <a:off x="2609552" y="2210721"/>
+            <a:ext cx="0" cy="722788"/>
+          </a:xfrm>
+          <a:prstGeom prst="straightConnector1">
+            <a:avLst/>
+          </a:prstGeom>
+          <a:ln>
+            <a:tailEnd type="triangle"/>
+          </a:ln>
+        </p:spPr>
+        <p:style>
+          <a:lnRef idx="1">
+            <a:schemeClr val="accent1"/>
+          </a:lnRef>
+          <a:fillRef idx="0">
+            <a:schemeClr val="accent1"/>
+          </a:fillRef>
+          <a:effectRef idx="0">
+            <a:schemeClr val="accent1"/>
+          </a:effectRef>
+          <a:fontRef idx="minor">
+            <a:schemeClr val="tx1"/>
+          </a:fontRef>
+        </p:style>
+      </p:cxnSp>
+      <p:cxnSp>
+        <p:nvCxnSpPr>
+          <p:cNvPr id="11" name="Straight Arrow Connector 10">
+            <a:extLst>
+              <a:ext uri="{FF2B5EF4-FFF2-40B4-BE49-F238E27FC236}">
+                <a16:creationId xmlns:a16="http://schemas.microsoft.com/office/drawing/2014/main" id="{7148C347-B741-8C06-1DF9-F04289BEBF82}"/>
+              </a:ext>
+            </a:extLst>
+          </p:cNvPr>
+          <p:cNvCxnSpPr>
+            <a:cxnSpLocks/>
+            <a:stCxn id="7" idx="2"/>
+          </p:cNvCxnSpPr>
+          <p:nvPr/>
+        </p:nvCxnSpPr>
+        <p:spPr>
+          <a:xfrm>
+            <a:off x="4560273" y="2210721"/>
+            <a:ext cx="0" cy="722788"/>
+          </a:xfrm>
+          <a:prstGeom prst="straightConnector1">
+            <a:avLst/>
+          </a:prstGeom>
+          <a:ln>
+            <a:tailEnd type="triangle"/>
+          </a:ln>
+        </p:spPr>
+        <p:style>
+          <a:lnRef idx="1">
+            <a:schemeClr val="accent1"/>
+          </a:lnRef>
+          <a:fillRef idx="0">
+            <a:schemeClr val="accent1"/>
+          </a:fillRef>
+          <a:effectRef idx="0">
+            <a:schemeClr val="accent1"/>
+          </a:effectRef>
+          <a:fontRef idx="minor">
+            <a:schemeClr val="tx1"/>
+          </a:fontRef>
+        </p:style>
+      </p:cxnSp>
+      <p:cxnSp>
+        <p:nvCxnSpPr>
+          <p:cNvPr id="28" name="Straight Connector 27">
+            <a:extLst>
+              <a:ext uri="{FF2B5EF4-FFF2-40B4-BE49-F238E27FC236}">
+                <a16:creationId xmlns:a16="http://schemas.microsoft.com/office/drawing/2014/main" id="{7C427D4A-A72D-B718-DDC6-1FC6EA02C59C}"/>
+              </a:ext>
+            </a:extLst>
+          </p:cNvPr>
+          <p:cNvCxnSpPr/>
+          <p:nvPr/>
+        </p:nvCxnSpPr>
+        <p:spPr>
+          <a:xfrm>
+            <a:off x="5886326" y="854854"/>
+            <a:ext cx="0" cy="5328592"/>
+          </a:xfrm>
+          <a:prstGeom prst="line">
+            <a:avLst/>
+          </a:prstGeom>
+        </p:spPr>
+        <p:style>
+          <a:lnRef idx="1">
+            <a:schemeClr val="accent1"/>
+          </a:lnRef>
+          <a:fillRef idx="0">
+            <a:schemeClr val="accent1"/>
+          </a:fillRef>
+          <a:effectRef idx="0">
+            <a:schemeClr val="accent1"/>
+          </a:effectRef>
+          <a:fontRef idx="minor">
+            <a:schemeClr val="tx1"/>
+          </a:fontRef>
+        </p:style>
+      </p:cxnSp>
+      <p:sp>
+        <p:nvSpPr>
+          <p:cNvPr id="42" name="TextBox 41">
+            <a:extLst>
+              <a:ext uri="{FF2B5EF4-FFF2-40B4-BE49-F238E27FC236}">
+                <a16:creationId xmlns:a16="http://schemas.microsoft.com/office/drawing/2014/main" id="{CFC37DE4-A1C0-E3B3-847A-35C1468E5C7B}"/>
+              </a:ext>
+            </a:extLst>
+          </p:cNvPr>
+          <p:cNvSpPr txBox="1"/>
+          <p:nvPr/>
+        </p:nvSpPr>
+        <p:spPr>
+          <a:xfrm>
+            <a:off x="2933566" y="981522"/>
+            <a:ext cx="1440074" cy="400110"/>
+          </a:xfrm>
+          <a:prstGeom prst="rect">
+            <a:avLst/>
+          </a:prstGeom>
+          <a:noFill/>
+        </p:spPr>
+        <p:txBody>
+          <a:bodyPr wrap="none" rtlCol="0">
+            <a:spAutoFit/>
+          </a:bodyPr>
+          <a:lstStyle/>
+          <a:p>
+            <a:pPr algn="ctr"/>
+            <a:r>
+              <a:rPr lang="en-US" sz="2000" b="1" dirty="0"/>
+              <a:t>Static Link</a:t>
+            </a:r>
+          </a:p>
+        </p:txBody>
+      </p:sp>
+      <p:sp>
+        <p:nvSpPr>
+          <p:cNvPr id="43" name="Rectangle 42">
+            <a:extLst>
+              <a:ext uri="{FF2B5EF4-FFF2-40B4-BE49-F238E27FC236}">
+                <a16:creationId xmlns:a16="http://schemas.microsoft.com/office/drawing/2014/main" id="{61238DB5-0546-EA18-94A2-C831CC30F081}"/>
+              </a:ext>
+            </a:extLst>
+          </p:cNvPr>
+          <p:cNvSpPr/>
+          <p:nvPr/>
+        </p:nvSpPr>
+        <p:spPr>
+          <a:xfrm>
+            <a:off x="6436204" y="2563664"/>
+            <a:ext cx="3462067" cy="1802234"/>
+          </a:xfrm>
+          <a:prstGeom prst="rect">
+            <a:avLst/>
+          </a:prstGeom>
+        </p:spPr>
+        <p:style>
+          <a:lnRef idx="2">
+            <a:schemeClr val="accent1"/>
+          </a:lnRef>
+          <a:fillRef idx="1">
+            <a:schemeClr val="lt1"/>
+          </a:fillRef>
+          <a:effectRef idx="0">
+            <a:schemeClr val="accent1"/>
+          </a:effectRef>
+          <a:fontRef idx="minor">
+            <a:schemeClr val="dk1"/>
+          </a:fontRef>
+        </p:style>
+        <p:txBody>
+          <a:bodyPr rtlCol="0" anchor="ctr"/>
+          <a:lstStyle/>
+          <a:p>
+            <a:pPr algn="ctr"/>
+            <a:r>
+              <a:rPr lang="en-US" altLang="ja-JP" dirty="0" err="1"/>
+              <a:t>rcl</a:t>
+            </a:r>
+            <a:endParaRPr lang="en-US" altLang="ja-JP" dirty="0"/>
+          </a:p>
+          <a:p>
+            <a:pPr algn="ctr"/>
+            <a:endParaRPr lang="en-US" altLang="ja-JP" dirty="0"/>
+          </a:p>
+          <a:p>
+            <a:pPr algn="ctr"/>
+            <a:endParaRPr lang="en-US" altLang="ja-JP" dirty="0"/>
+          </a:p>
+          <a:p>
+            <a:pPr algn="ctr"/>
+            <a:endParaRPr lang="en-US" altLang="ja-JP" dirty="0"/>
+          </a:p>
+          <a:p>
+            <a:pPr algn="ctr"/>
+            <a:endParaRPr lang="en-US" altLang="ja-JP" dirty="0"/>
+          </a:p>
+          <a:p>
+            <a:pPr algn="ctr"/>
+            <a:endParaRPr kumimoji="1" lang="ja-JP" altLang="en-US" dirty="0"/>
+          </a:p>
+        </p:txBody>
+      </p:sp>
+      <p:sp>
+        <p:nvSpPr>
+          <p:cNvPr id="44" name="Rectangle 43">
+            <a:extLst>
+              <a:ext uri="{FF2B5EF4-FFF2-40B4-BE49-F238E27FC236}">
+                <a16:creationId xmlns:a16="http://schemas.microsoft.com/office/drawing/2014/main" id="{2D93F30C-E849-0EEC-0B69-98752108F2D7}"/>
+              </a:ext>
+            </a:extLst>
+          </p:cNvPr>
+          <p:cNvSpPr/>
+          <p:nvPr/>
+        </p:nvSpPr>
+        <p:spPr>
+          <a:xfrm>
+            <a:off x="6647232" y="2861501"/>
+            <a:ext cx="3062808" cy="496285"/>
+          </a:xfrm>
+          <a:prstGeom prst="rect">
+            <a:avLst/>
+          </a:prstGeom>
+        </p:spPr>
+        <p:style>
+          <a:lnRef idx="1">
+            <a:schemeClr val="accent4"/>
+          </a:lnRef>
+          <a:fillRef idx="2">
+            <a:schemeClr val="accent4"/>
+          </a:fillRef>
+          <a:effectRef idx="1">
+            <a:schemeClr val="accent4"/>
+          </a:effectRef>
+          <a:fontRef idx="minor">
+            <a:schemeClr val="dk1"/>
+          </a:fontRef>
+        </p:style>
+        <p:txBody>
+          <a:bodyPr rtlCol="0" anchor="ctr"/>
+          <a:lstStyle/>
+          <a:p>
+            <a:pPr algn="ctr"/>
+            <a:r>
+              <a:rPr lang="en-US" altLang="ja-JP" dirty="0" err="1"/>
+              <a:t>r</a:t>
+            </a:r>
+            <a:r>
+              <a:rPr kumimoji="1" lang="en-US" altLang="ja-JP" dirty="0" err="1"/>
+              <a:t>cl_logging_interface</a:t>
+            </a:r>
+            <a:endParaRPr kumimoji="1" lang="ja-JP" altLang="en-US" dirty="0"/>
+          </a:p>
+        </p:txBody>
+      </p:sp>
+      <p:sp>
+        <p:nvSpPr>
+          <p:cNvPr id="45" name="Rectangle 44">
+            <a:extLst>
+              <a:ext uri="{FF2B5EF4-FFF2-40B4-BE49-F238E27FC236}">
+                <a16:creationId xmlns:a16="http://schemas.microsoft.com/office/drawing/2014/main" id="{6DBBB359-9938-0DB4-8D59-A3CB09577265}"/>
+              </a:ext>
+            </a:extLst>
+          </p:cNvPr>
+          <p:cNvSpPr/>
+          <p:nvPr/>
+        </p:nvSpPr>
+        <p:spPr>
+          <a:xfrm>
+            <a:off x="6611964" y="5248860"/>
+            <a:ext cx="1511345" cy="398383"/>
+          </a:xfrm>
+          <a:prstGeom prst="rect">
+            <a:avLst/>
+          </a:prstGeom>
+        </p:spPr>
+        <p:style>
+          <a:lnRef idx="2">
+            <a:schemeClr val="accent1"/>
+          </a:lnRef>
+          <a:fillRef idx="1">
+            <a:schemeClr val="lt1"/>
+          </a:fillRef>
+          <a:effectRef idx="0">
+            <a:schemeClr val="accent1"/>
+          </a:effectRef>
+          <a:fontRef idx="minor">
+            <a:schemeClr val="dk1"/>
+          </a:fontRef>
+        </p:style>
+        <p:txBody>
+          <a:bodyPr rtlCol="0" anchor="ctr"/>
+          <a:lstStyle/>
+          <a:p>
+            <a:pPr algn="ctr"/>
+            <a:r>
+              <a:rPr kumimoji="1" lang="en-US" altLang="ja-JP" dirty="0" err="1"/>
+              <a:t>spdlog</a:t>
+            </a:r>
+            <a:endParaRPr kumimoji="1" lang="ja-JP" altLang="en-US" dirty="0"/>
+          </a:p>
+        </p:txBody>
+      </p:sp>
+      <p:cxnSp>
+        <p:nvCxnSpPr>
+          <p:cNvPr id="46" name="Straight Arrow Connector 45">
+            <a:extLst>
+              <a:ext uri="{FF2B5EF4-FFF2-40B4-BE49-F238E27FC236}">
+                <a16:creationId xmlns:a16="http://schemas.microsoft.com/office/drawing/2014/main" id="{C4FB29E9-12B8-3D67-30E3-CB969681CB16}"/>
+              </a:ext>
+            </a:extLst>
+          </p:cNvPr>
+          <p:cNvCxnSpPr>
+            <a:cxnSpLocks/>
+            <a:stCxn id="59" idx="2"/>
+            <a:endCxn id="45" idx="0"/>
+          </p:cNvCxnSpPr>
+          <p:nvPr/>
+        </p:nvCxnSpPr>
+        <p:spPr>
+          <a:xfrm>
+            <a:off x="7367637" y="4974911"/>
+            <a:ext cx="0" cy="273949"/>
+          </a:xfrm>
+          <a:prstGeom prst="straightConnector1">
+            <a:avLst/>
+          </a:prstGeom>
+          <a:ln>
+            <a:tailEnd type="triangle"/>
+          </a:ln>
+        </p:spPr>
+        <p:style>
+          <a:lnRef idx="1">
+            <a:schemeClr val="accent1"/>
+          </a:lnRef>
+          <a:fillRef idx="0">
+            <a:schemeClr val="accent1"/>
+          </a:fillRef>
+          <a:effectRef idx="0">
+            <a:schemeClr val="accent1"/>
+          </a:effectRef>
+          <a:fontRef idx="minor">
+            <a:schemeClr val="tx1"/>
+          </a:fontRef>
+        </p:style>
+      </p:cxnSp>
+      <p:sp>
+        <p:nvSpPr>
+          <p:cNvPr id="47" name="Rectangle 46">
+            <a:extLst>
+              <a:ext uri="{FF2B5EF4-FFF2-40B4-BE49-F238E27FC236}">
+                <a16:creationId xmlns:a16="http://schemas.microsoft.com/office/drawing/2014/main" id="{24B4976B-AA77-54AF-3545-E3C2810D564E}"/>
+              </a:ext>
+            </a:extLst>
+          </p:cNvPr>
+          <p:cNvSpPr/>
+          <p:nvPr/>
+        </p:nvSpPr>
+        <p:spPr>
+          <a:xfrm>
+            <a:off x="6436204" y="1701602"/>
+            <a:ext cx="1511347" cy="509119"/>
+          </a:xfrm>
+          <a:prstGeom prst="rect">
+            <a:avLst/>
+          </a:prstGeom>
+        </p:spPr>
+        <p:style>
+          <a:lnRef idx="2">
+            <a:schemeClr val="accent1"/>
+          </a:lnRef>
+          <a:fillRef idx="1">
+            <a:schemeClr val="lt1"/>
+          </a:fillRef>
+          <a:effectRef idx="0">
+            <a:schemeClr val="accent1"/>
+          </a:effectRef>
+          <a:fontRef idx="minor">
+            <a:schemeClr val="dk1"/>
+          </a:fontRef>
+        </p:style>
+        <p:txBody>
+          <a:bodyPr rtlCol="0" anchor="ctr"/>
+          <a:lstStyle/>
+          <a:p>
+            <a:pPr algn="ctr"/>
+            <a:r>
+              <a:rPr kumimoji="1" lang="en-US" altLang="ja-JP" dirty="0"/>
+              <a:t>ROS app</a:t>
+            </a:r>
+            <a:endParaRPr kumimoji="1" lang="ja-JP" altLang="en-US" dirty="0"/>
+          </a:p>
+        </p:txBody>
+      </p:sp>
+      <p:sp>
+        <p:nvSpPr>
+          <p:cNvPr id="48" name="Rectangle 47">
+            <a:extLst>
+              <a:ext uri="{FF2B5EF4-FFF2-40B4-BE49-F238E27FC236}">
+                <a16:creationId xmlns:a16="http://schemas.microsoft.com/office/drawing/2014/main" id="{D38D0A22-8EB9-6FC6-BB53-46CF6325C9A5}"/>
+              </a:ext>
+            </a:extLst>
+          </p:cNvPr>
+          <p:cNvSpPr/>
+          <p:nvPr/>
+        </p:nvSpPr>
+        <p:spPr>
+          <a:xfrm>
+            <a:off x="8386925" y="1701602"/>
+            <a:ext cx="1511347" cy="509119"/>
+          </a:xfrm>
+          <a:prstGeom prst="rect">
+            <a:avLst/>
+          </a:prstGeom>
+        </p:spPr>
+        <p:style>
+          <a:lnRef idx="2">
+            <a:schemeClr val="accent1"/>
+          </a:lnRef>
+          <a:fillRef idx="1">
+            <a:schemeClr val="lt1"/>
+          </a:fillRef>
+          <a:effectRef idx="0">
+            <a:schemeClr val="accent1"/>
+          </a:effectRef>
+          <a:fontRef idx="minor">
+            <a:schemeClr val="dk1"/>
+          </a:fontRef>
+        </p:style>
+        <p:txBody>
+          <a:bodyPr rtlCol="0" anchor="ctr"/>
+          <a:lstStyle/>
+          <a:p>
+            <a:pPr algn="ctr"/>
+            <a:r>
+              <a:rPr kumimoji="1" lang="en-US" altLang="ja-JP" dirty="0"/>
+              <a:t>ROS app</a:t>
+            </a:r>
+            <a:endParaRPr kumimoji="1" lang="ja-JP" altLang="en-US" dirty="0"/>
+          </a:p>
+        </p:txBody>
+      </p:sp>
+      <p:sp>
+        <p:nvSpPr>
+          <p:cNvPr id="49" name="Rectangle 48">
+            <a:extLst>
+              <a:ext uri="{FF2B5EF4-FFF2-40B4-BE49-F238E27FC236}">
+                <a16:creationId xmlns:a16="http://schemas.microsoft.com/office/drawing/2014/main" id="{F5B5F0B5-2815-B695-0CAC-1037E656906E}"/>
+              </a:ext>
+            </a:extLst>
+          </p:cNvPr>
+          <p:cNvSpPr/>
+          <p:nvPr/>
+        </p:nvSpPr>
+        <p:spPr>
+          <a:xfrm>
+            <a:off x="6652584" y="3645818"/>
+            <a:ext cx="3062808" cy="496285"/>
+          </a:xfrm>
+          <a:prstGeom prst="rect">
+            <a:avLst/>
+          </a:prstGeom>
+          <a:ln/>
+        </p:spPr>
+        <p:style>
+          <a:lnRef idx="0">
+            <a:schemeClr val="accent1"/>
+          </a:lnRef>
+          <a:fillRef idx="3">
+            <a:schemeClr val="accent1"/>
+          </a:fillRef>
+          <a:effectRef idx="3">
+            <a:schemeClr val="accent1"/>
+          </a:effectRef>
+          <a:fontRef idx="minor">
+            <a:schemeClr val="lt1"/>
+          </a:fontRef>
+        </p:style>
+        <p:txBody>
+          <a:bodyPr rtlCol="0" anchor="ctr"/>
+          <a:lstStyle/>
+          <a:p>
+            <a:pPr algn="ctr"/>
+            <a:r>
+              <a:rPr lang="en-US" altLang="ja-JP" sz="1600" b="1" dirty="0" err="1">
+                <a:solidFill>
+                  <a:schemeClr val="bg1"/>
+                </a:solidFill>
+              </a:rPr>
+              <a:t>r</a:t>
+            </a:r>
+            <a:r>
+              <a:rPr kumimoji="1" lang="en-US" altLang="ja-JP" sz="1600" b="1" dirty="0" err="1">
+                <a:solidFill>
+                  <a:schemeClr val="bg1"/>
+                </a:solidFill>
+              </a:rPr>
+              <a:t>cl_logging_</a:t>
+            </a:r>
+            <a:r>
+              <a:rPr lang="en-US" altLang="ja-JP" sz="1600" b="1" dirty="0" err="1">
+                <a:solidFill>
+                  <a:schemeClr val="bg1"/>
+                </a:solidFill>
+              </a:rPr>
+              <a:t>implementation</a:t>
+            </a:r>
+            <a:endParaRPr kumimoji="1" lang="ja-JP" altLang="en-US" sz="1600" b="1" dirty="0">
+              <a:solidFill>
+                <a:schemeClr val="bg1"/>
+              </a:solidFill>
+            </a:endParaRPr>
+          </a:p>
+        </p:txBody>
+      </p:sp>
+      <p:cxnSp>
+        <p:nvCxnSpPr>
+          <p:cNvPr id="50" name="Straight Arrow Connector 49">
+            <a:extLst>
+              <a:ext uri="{FF2B5EF4-FFF2-40B4-BE49-F238E27FC236}">
+                <a16:creationId xmlns:a16="http://schemas.microsoft.com/office/drawing/2014/main" id="{B8231E8A-8597-0137-5874-778D2044DEBD}"/>
+              </a:ext>
+            </a:extLst>
+          </p:cNvPr>
+          <p:cNvCxnSpPr>
+            <a:cxnSpLocks/>
+            <a:stCxn id="44" idx="2"/>
+            <a:endCxn id="49" idx="0"/>
+          </p:cNvCxnSpPr>
+          <p:nvPr/>
+        </p:nvCxnSpPr>
+        <p:spPr>
+          <a:xfrm>
+            <a:off x="8178636" y="3357786"/>
+            <a:ext cx="5352" cy="288032"/>
+          </a:xfrm>
+          <a:prstGeom prst="straightConnector1">
+            <a:avLst/>
+          </a:prstGeom>
+          <a:ln>
+            <a:tailEnd type="triangle"/>
+          </a:ln>
+        </p:spPr>
+        <p:style>
+          <a:lnRef idx="1">
+            <a:schemeClr val="accent1"/>
+          </a:lnRef>
+          <a:fillRef idx="0">
+            <a:schemeClr val="accent1"/>
+          </a:fillRef>
+          <a:effectRef idx="0">
+            <a:schemeClr val="accent1"/>
+          </a:effectRef>
+          <a:fontRef idx="minor">
+            <a:schemeClr val="tx1"/>
+          </a:fontRef>
+        </p:style>
+      </p:cxnSp>
+      <p:cxnSp>
+        <p:nvCxnSpPr>
+          <p:cNvPr id="51" name="Straight Arrow Connector 50">
+            <a:extLst>
+              <a:ext uri="{FF2B5EF4-FFF2-40B4-BE49-F238E27FC236}">
+                <a16:creationId xmlns:a16="http://schemas.microsoft.com/office/drawing/2014/main" id="{965009C9-9D60-4311-0793-407FB39FC3F9}"/>
+              </a:ext>
+            </a:extLst>
+          </p:cNvPr>
+          <p:cNvCxnSpPr>
+            <a:cxnSpLocks/>
+            <a:stCxn id="47" idx="2"/>
+          </p:cNvCxnSpPr>
+          <p:nvPr/>
+        </p:nvCxnSpPr>
+        <p:spPr>
+          <a:xfrm>
+            <a:off x="7191878" y="2210721"/>
+            <a:ext cx="0" cy="650780"/>
+          </a:xfrm>
+          <a:prstGeom prst="straightConnector1">
+            <a:avLst/>
+          </a:prstGeom>
+          <a:ln>
+            <a:tailEnd type="triangle"/>
+          </a:ln>
+        </p:spPr>
+        <p:style>
+          <a:lnRef idx="1">
+            <a:schemeClr val="accent1"/>
+          </a:lnRef>
+          <a:fillRef idx="0">
+            <a:schemeClr val="accent1"/>
+          </a:fillRef>
+          <a:effectRef idx="0">
+            <a:schemeClr val="accent1"/>
+          </a:effectRef>
+          <a:fontRef idx="minor">
+            <a:schemeClr val="tx1"/>
+          </a:fontRef>
+        </p:style>
+      </p:cxnSp>
+      <p:cxnSp>
+        <p:nvCxnSpPr>
+          <p:cNvPr id="52" name="Straight Arrow Connector 51">
+            <a:extLst>
+              <a:ext uri="{FF2B5EF4-FFF2-40B4-BE49-F238E27FC236}">
+                <a16:creationId xmlns:a16="http://schemas.microsoft.com/office/drawing/2014/main" id="{C39317C0-B4B8-8124-5294-0CE772673B2E}"/>
+              </a:ext>
+            </a:extLst>
+          </p:cNvPr>
+          <p:cNvCxnSpPr>
+            <a:cxnSpLocks/>
+            <a:stCxn id="48" idx="2"/>
+          </p:cNvCxnSpPr>
+          <p:nvPr/>
+        </p:nvCxnSpPr>
+        <p:spPr>
+          <a:xfrm>
+            <a:off x="9142599" y="2210721"/>
+            <a:ext cx="17622" cy="650780"/>
+          </a:xfrm>
+          <a:prstGeom prst="straightConnector1">
+            <a:avLst/>
+          </a:prstGeom>
+          <a:ln>
+            <a:tailEnd type="triangle"/>
+          </a:ln>
+        </p:spPr>
+        <p:style>
+          <a:lnRef idx="1">
+            <a:schemeClr val="accent1"/>
+          </a:lnRef>
+          <a:fillRef idx="0">
+            <a:schemeClr val="accent1"/>
+          </a:fillRef>
+          <a:effectRef idx="0">
+            <a:schemeClr val="accent1"/>
+          </a:effectRef>
+          <a:fontRef idx="minor">
+            <a:schemeClr val="tx1"/>
+          </a:fontRef>
+        </p:style>
+      </p:cxnSp>
+      <p:sp>
+        <p:nvSpPr>
+          <p:cNvPr id="53" name="TextBox 52">
+            <a:extLst>
+              <a:ext uri="{FF2B5EF4-FFF2-40B4-BE49-F238E27FC236}">
+                <a16:creationId xmlns:a16="http://schemas.microsoft.com/office/drawing/2014/main" id="{F949E337-91A3-D7F2-8489-185E0ABACE41}"/>
+              </a:ext>
+            </a:extLst>
+          </p:cNvPr>
+          <p:cNvSpPr txBox="1"/>
+          <p:nvPr/>
+        </p:nvSpPr>
+        <p:spPr>
+          <a:xfrm>
+            <a:off x="7311637" y="981522"/>
+            <a:ext cx="1848584" cy="400110"/>
+          </a:xfrm>
+          <a:prstGeom prst="rect">
+            <a:avLst/>
+          </a:prstGeom>
+          <a:noFill/>
+        </p:spPr>
+        <p:txBody>
+          <a:bodyPr wrap="none" rtlCol="0">
+            <a:spAutoFit/>
+          </a:bodyPr>
+          <a:lstStyle/>
+          <a:p>
+            <a:pPr algn="ctr"/>
+            <a:r>
+              <a:rPr lang="en-US" sz="2000" b="1" dirty="0"/>
+              <a:t>Dynamic Link</a:t>
+            </a:r>
+          </a:p>
+        </p:txBody>
+      </p:sp>
+      <p:sp>
+        <p:nvSpPr>
+          <p:cNvPr id="59" name="Rectangle 58">
+            <a:extLst>
+              <a:ext uri="{FF2B5EF4-FFF2-40B4-BE49-F238E27FC236}">
+                <a16:creationId xmlns:a16="http://schemas.microsoft.com/office/drawing/2014/main" id="{8E95FD78-4C70-89E6-B77D-6340A56AE0EC}"/>
+              </a:ext>
+            </a:extLst>
+          </p:cNvPr>
+          <p:cNvSpPr/>
+          <p:nvPr/>
+        </p:nvSpPr>
+        <p:spPr>
+          <a:xfrm>
+            <a:off x="6606406" y="4522679"/>
+            <a:ext cx="1522462" cy="452232"/>
+          </a:xfrm>
+          <a:prstGeom prst="rect">
+            <a:avLst/>
+          </a:prstGeom>
+        </p:spPr>
+        <p:style>
+          <a:lnRef idx="1">
+            <a:schemeClr val="accent4"/>
+          </a:lnRef>
+          <a:fillRef idx="2">
+            <a:schemeClr val="accent4"/>
+          </a:fillRef>
+          <a:effectRef idx="1">
+            <a:schemeClr val="accent4"/>
+          </a:effectRef>
+          <a:fontRef idx="minor">
+            <a:schemeClr val="dk1"/>
+          </a:fontRef>
+        </p:style>
+        <p:txBody>
+          <a:bodyPr rtlCol="0" anchor="ctr"/>
+          <a:lstStyle/>
+          <a:p>
+            <a:pPr algn="ctr"/>
+            <a:r>
+              <a:rPr lang="en-US" altLang="ja-JP" sz="1200" dirty="0" err="1"/>
+              <a:t>r</a:t>
+            </a:r>
+            <a:r>
+              <a:rPr kumimoji="1" lang="en-US" altLang="ja-JP" sz="1200" dirty="0" err="1"/>
+              <a:t>cl_logging_</a:t>
+            </a:r>
+            <a:r>
+              <a:rPr lang="en-US" altLang="ja-JP" sz="1200" dirty="0" err="1"/>
+              <a:t>spdlog</a:t>
+            </a:r>
+            <a:endParaRPr kumimoji="1" lang="ja-JP" altLang="en-US" sz="1200" dirty="0"/>
+          </a:p>
+        </p:txBody>
+      </p:sp>
+      <p:cxnSp>
+        <p:nvCxnSpPr>
+          <p:cNvPr id="66" name="Straight Arrow Connector 65">
+            <a:extLst>
+              <a:ext uri="{FF2B5EF4-FFF2-40B4-BE49-F238E27FC236}">
+                <a16:creationId xmlns:a16="http://schemas.microsoft.com/office/drawing/2014/main" id="{585A74CE-7ECA-BEE8-1C16-8A526144A5E9}"/>
+              </a:ext>
+            </a:extLst>
+          </p:cNvPr>
+          <p:cNvCxnSpPr>
+            <a:cxnSpLocks/>
+            <a:endCxn id="59" idx="0"/>
+          </p:cNvCxnSpPr>
+          <p:nvPr/>
+        </p:nvCxnSpPr>
+        <p:spPr>
+          <a:xfrm>
+            <a:off x="7367636" y="4151006"/>
+            <a:ext cx="1" cy="371673"/>
+          </a:xfrm>
+          <a:prstGeom prst="straightConnector1">
+            <a:avLst/>
+          </a:prstGeom>
+          <a:ln>
+            <a:tailEnd type="triangle"/>
+          </a:ln>
+        </p:spPr>
+        <p:style>
+          <a:lnRef idx="1">
+            <a:schemeClr val="accent1"/>
+          </a:lnRef>
+          <a:fillRef idx="0">
+            <a:schemeClr val="accent1"/>
+          </a:fillRef>
+          <a:effectRef idx="0">
+            <a:schemeClr val="accent1"/>
+          </a:effectRef>
+          <a:fontRef idx="minor">
+            <a:schemeClr val="tx1"/>
+          </a:fontRef>
+        </p:style>
+      </p:cxnSp>
+      <p:sp>
+        <p:nvSpPr>
+          <p:cNvPr id="73" name="Rectangle 72">
+            <a:extLst>
+              <a:ext uri="{FF2B5EF4-FFF2-40B4-BE49-F238E27FC236}">
+                <a16:creationId xmlns:a16="http://schemas.microsoft.com/office/drawing/2014/main" id="{3DADA013-C646-5379-3976-3525984194B9}"/>
+              </a:ext>
+            </a:extLst>
+          </p:cNvPr>
+          <p:cNvSpPr/>
+          <p:nvPr/>
+        </p:nvSpPr>
+        <p:spPr>
+          <a:xfrm>
+            <a:off x="8341810" y="4529164"/>
+            <a:ext cx="1522462" cy="452232"/>
+          </a:xfrm>
+          <a:prstGeom prst="rect">
+            <a:avLst/>
+          </a:prstGeom>
+        </p:spPr>
+        <p:style>
+          <a:lnRef idx="1">
+            <a:schemeClr val="accent4"/>
+          </a:lnRef>
+          <a:fillRef idx="2">
+            <a:schemeClr val="accent4"/>
+          </a:fillRef>
+          <a:effectRef idx="1">
+            <a:schemeClr val="accent4"/>
+          </a:effectRef>
+          <a:fontRef idx="minor">
+            <a:schemeClr val="dk1"/>
+          </a:fontRef>
+        </p:style>
+        <p:txBody>
+          <a:bodyPr rtlCol="0" anchor="ctr"/>
+          <a:lstStyle/>
+          <a:p>
+            <a:pPr algn="ctr"/>
+            <a:r>
+              <a:rPr lang="en-US" altLang="ja-JP" sz="1200" dirty="0" err="1"/>
+              <a:t>r</a:t>
+            </a:r>
+            <a:r>
+              <a:rPr kumimoji="1" lang="en-US" altLang="ja-JP" sz="1200" dirty="0" err="1"/>
+              <a:t>cl_logging_noop</a:t>
+            </a:r>
+            <a:endParaRPr kumimoji="1" lang="ja-JP" altLang="en-US" sz="1200" dirty="0"/>
+          </a:p>
+        </p:txBody>
+      </p:sp>
+      <p:cxnSp>
+        <p:nvCxnSpPr>
+          <p:cNvPr id="74" name="Straight Arrow Connector 73">
+            <a:extLst>
+              <a:ext uri="{FF2B5EF4-FFF2-40B4-BE49-F238E27FC236}">
+                <a16:creationId xmlns:a16="http://schemas.microsoft.com/office/drawing/2014/main" id="{ED281150-B652-088B-4F15-46DF71594826}"/>
+              </a:ext>
+            </a:extLst>
+          </p:cNvPr>
+          <p:cNvCxnSpPr>
+            <a:cxnSpLocks/>
+            <a:endCxn id="73" idx="0"/>
+          </p:cNvCxnSpPr>
+          <p:nvPr/>
+        </p:nvCxnSpPr>
+        <p:spPr>
+          <a:xfrm>
+            <a:off x="9103040" y="4142103"/>
+            <a:ext cx="1" cy="387061"/>
+          </a:xfrm>
+          <a:prstGeom prst="straightConnector1">
+            <a:avLst/>
+          </a:prstGeom>
+          <a:ln>
+            <a:tailEnd type="triangle"/>
+          </a:ln>
+        </p:spPr>
+        <p:style>
+          <a:lnRef idx="1">
+            <a:schemeClr val="accent1"/>
+          </a:lnRef>
+          <a:fillRef idx="0">
+            <a:schemeClr val="accent1"/>
+          </a:fillRef>
+          <a:effectRef idx="0">
+            <a:schemeClr val="accent1"/>
+          </a:effectRef>
+          <a:fontRef idx="minor">
+            <a:schemeClr val="tx1"/>
+          </a:fontRef>
+        </p:style>
+      </p:cxnSp>
+    </p:spTree>
+    <p:extLst>
+      <p:ext uri="{BB962C8B-B14F-4D97-AF65-F5344CB8AC3E}">
+        <p14:creationId xmlns:p14="http://schemas.microsoft.com/office/powerpoint/2010/main" val="814147201"/>
+      </p:ext>
+    </p:extLst>
+  </p:cSld>
+  <p:clrMapOvr>
+    <a:masterClrMapping/>
+  </p:clrMapOvr>
+  <mc:AlternateContent xmlns:mc="http://schemas.openxmlformats.org/markup-compatibility/2006" xmlns:p14="http://schemas.microsoft.com/office/powerpoint/2010/main">
+    <mc:Choice Requires="p14">
+      <p:transition spd="med" p14:dur="700">
+        <p:fade/>
+      </p:transition>
+    </mc:Choice>
+    <mc:Fallback xmlns="">
+      <p:transition xmlns:p14="http://schemas.microsoft.com/office/powerpoint/2010/main" spd="med">
+        <p:fade/>
+      </p:transition>
+    </mc:Fallback>
+  </mc:AlternateContent>
+</p:sld>
+</file>
+
 <file path=ppt/slides/slide2.xml><?xml version="1.0" encoding="utf-8"?>
 <p:sld xmlns:a="http://schemas.openxmlformats.org/drawingml/2006/main" xmlns:r="http://schemas.openxmlformats.org/officeDocument/2006/relationships" xmlns:p="http://schemas.openxmlformats.org/presentationml/2006/main">
   <p:cSld>

</xml_diff>